<commit_message>
Future & Technical Challenges
</commit_message>
<xml_diff>
--- a/IBM_Finish_Line.pptx
+++ b/IBM_Finish_Line.pptx
@@ -5,7 +5,7 @@
     <p:sldMasterId id="2147483869" r:id="rId1"/>
   </p:sldMasterIdLst>
   <p:notesMasterIdLst>
-    <p:notesMasterId r:id="rId15"/>
+    <p:notesMasterId r:id="rId16"/>
   </p:notesMasterIdLst>
   <p:sldIdLst>
     <p:sldId id="260" r:id="rId2"/>
@@ -16,11 +16,12 @@
     <p:sldId id="275" r:id="rId7"/>
     <p:sldId id="268" r:id="rId8"/>
     <p:sldId id="264" r:id="rId9"/>
-    <p:sldId id="269" r:id="rId10"/>
-    <p:sldId id="274" r:id="rId11"/>
-    <p:sldId id="277" r:id="rId12"/>
-    <p:sldId id="271" r:id="rId13"/>
-    <p:sldId id="272" r:id="rId14"/>
+    <p:sldId id="279" r:id="rId10"/>
+    <p:sldId id="280" r:id="rId11"/>
+    <p:sldId id="274" r:id="rId12"/>
+    <p:sldId id="277" r:id="rId13"/>
+    <p:sldId id="271" r:id="rId14"/>
+    <p:sldId id="272" r:id="rId15"/>
   </p:sldIdLst>
   <p:sldSz cx="9144000" cy="6858000" type="screen4x3"/>
   <p:notesSz cx="6858000" cy="9144000"/>
@@ -224,7 +225,7 @@
           <a:p>
             <a:fld id="{479FEF38-24CA-444D-8E5D-5C6061C6B495}" type="datetimeFigureOut">
               <a:rPr lang="en-US" smtClean="0"/>
-              <a:t>11/29/2017</a:t>
+              <a:t>11/29/17</a:t>
             </a:fld>
             <a:endParaRPr lang="en-US"/>
           </a:p>
@@ -489,6 +490,176 @@
     </a:lvl9pPr>
   </p:notesStyle>
 </p:notesMaster>
+</file>
+
+<file path=ppt/notesSlides/notesSlide1.xml><?xml version="1.0" encoding="utf-8"?>
+<p:notes xmlns:a="http://schemas.openxmlformats.org/drawingml/2006/main" xmlns:r="http://schemas.openxmlformats.org/officeDocument/2006/relationships" xmlns:p="http://schemas.openxmlformats.org/presentationml/2006/main">
+  <p:cSld>
+    <p:spTree>
+      <p:nvGrpSpPr>
+        <p:cNvPr id="1" name=""/>
+        <p:cNvGrpSpPr/>
+        <p:nvPr/>
+      </p:nvGrpSpPr>
+      <p:grpSpPr>
+        <a:xfrm>
+          <a:off x="0" y="0"/>
+          <a:ext cx="0" cy="0"/>
+          <a:chOff x="0" y="0"/>
+          <a:chExt cx="0" cy="0"/>
+        </a:xfrm>
+      </p:grpSpPr>
+      <p:sp>
+        <p:nvSpPr>
+          <p:cNvPr id="2" name="Slide Image Placeholder 1"/>
+          <p:cNvSpPr>
+            <a:spLocks noGrp="1" noRot="1" noChangeAspect="1"/>
+          </p:cNvSpPr>
+          <p:nvPr>
+            <p:ph type="sldImg"/>
+          </p:nvPr>
+        </p:nvSpPr>
+        <p:spPr/>
+      </p:sp>
+      <p:sp>
+        <p:nvSpPr>
+          <p:cNvPr id="3" name="Notes Placeholder 2"/>
+          <p:cNvSpPr>
+            <a:spLocks noGrp="1"/>
+          </p:cNvSpPr>
+          <p:nvPr>
+            <p:ph type="body" idx="1"/>
+          </p:nvPr>
+        </p:nvSpPr>
+        <p:spPr/>
+        <p:txBody>
+          <a:bodyPr/>
+          <a:lstStyle/>
+          <a:p>
+            <a:pPr marL="171450" indent="-171450">
+              <a:buFontTx/>
+              <a:buChar char="-"/>
+            </a:pPr>
+            <a:r>
+              <a:rPr lang="en-US" altLang="zh-CN" dirty="0" smtClean="0"/>
+              <a:t>Web</a:t>
+            </a:r>
+            <a:r>
+              <a:rPr lang="zh-CN" altLang="en-US" dirty="0" smtClean="0"/>
+              <a:t> </a:t>
+            </a:r>
+            <a:r>
+              <a:rPr lang="en-US" altLang="zh-CN" dirty="0" smtClean="0"/>
+              <a:t>scraping</a:t>
+            </a:r>
+            <a:r>
+              <a:rPr lang="zh-CN" altLang="en-US" dirty="0" smtClean="0"/>
+              <a:t> </a:t>
+            </a:r>
+            <a:r>
+              <a:rPr lang="en-US" altLang="zh-CN" dirty="0" smtClean="0"/>
+              <a:t>prices: the existing tools unknown, real-time prices</a:t>
+            </a:r>
+          </a:p>
+          <a:p>
+            <a:pPr marL="171450" indent="-171450">
+              <a:buFontTx/>
+              <a:buChar char="-"/>
+            </a:pPr>
+            <a:r>
+              <a:rPr lang="en-US" altLang="zh-CN" dirty="0" smtClean="0"/>
+              <a:t>Discovery API</a:t>
+            </a:r>
+            <a:r>
+              <a:rPr lang="en-US" altLang="zh-CN" baseline="0" dirty="0" smtClean="0"/>
+              <a:t>: integration of database to enhance the performance; connection to the Visual Recognition API.</a:t>
+            </a:r>
+          </a:p>
+          <a:p>
+            <a:pPr marL="171450" indent="-171450">
+              <a:buFontTx/>
+              <a:buChar char="-"/>
+            </a:pPr>
+            <a:r>
+              <a:rPr lang="en-US" altLang="zh-CN" baseline="0" dirty="0" smtClean="0"/>
+              <a:t>Visual </a:t>
+            </a:r>
+            <a:r>
+              <a:rPr lang="en-US" altLang="zh-CN" baseline="0" dirty="0" err="1" smtClean="0"/>
+              <a:t>recogtion</a:t>
+            </a:r>
+            <a:r>
+              <a:rPr lang="en-US" altLang="zh-CN" baseline="0" dirty="0" smtClean="0"/>
+              <a:t>: have a higher accuracy once the technology of recognizing product details improves. </a:t>
+            </a:r>
+          </a:p>
+          <a:p>
+            <a:pPr marL="171450" indent="-171450">
+              <a:buFontTx/>
+              <a:buChar char="-"/>
+            </a:pPr>
+            <a:endParaRPr lang="en-US" altLang="zh-CN" dirty="0" smtClean="0"/>
+          </a:p>
+          <a:p>
+            <a:pPr marL="171450" indent="-171450">
+              <a:buFontTx/>
+              <a:buChar char="-"/>
+            </a:pPr>
+            <a:endParaRPr lang="en-US" altLang="zh-CN" dirty="0" smtClean="0"/>
+          </a:p>
+          <a:p>
+            <a:pPr marL="171450" indent="-171450">
+              <a:buFontTx/>
+              <a:buChar char="-"/>
+            </a:pPr>
+            <a:endParaRPr lang="en-US" altLang="zh-CN" dirty="0" smtClean="0"/>
+          </a:p>
+          <a:p>
+            <a:pPr marL="171450" indent="-171450">
+              <a:buFontTx/>
+              <a:buChar char="-"/>
+            </a:pPr>
+            <a:endParaRPr lang="en-US" altLang="zh-CN" dirty="0" smtClean="0"/>
+          </a:p>
+          <a:p>
+            <a:endParaRPr lang="en-US" dirty="0"/>
+          </a:p>
+        </p:txBody>
+      </p:sp>
+      <p:sp>
+        <p:nvSpPr>
+          <p:cNvPr id="4" name="Slide Number Placeholder 3"/>
+          <p:cNvSpPr>
+            <a:spLocks noGrp="1"/>
+          </p:cNvSpPr>
+          <p:nvPr>
+            <p:ph type="sldNum" sz="quarter" idx="10"/>
+          </p:nvPr>
+        </p:nvSpPr>
+        <p:spPr/>
+        <p:txBody>
+          <a:bodyPr/>
+          <a:lstStyle/>
+          <a:p>
+            <a:fld id="{0BEC1035-22C6-4F8A-960B-5C00BC661B2D}" type="slidenum">
+              <a:rPr lang="en-US" smtClean="0"/>
+              <a:t>10</a:t>
+            </a:fld>
+            <a:endParaRPr lang="en-US"/>
+          </a:p>
+        </p:txBody>
+      </p:sp>
+    </p:spTree>
+    <p:extLst>
+      <p:ext uri="{BB962C8B-B14F-4D97-AF65-F5344CB8AC3E}">
+        <p14:creationId xmlns:p14="http://schemas.microsoft.com/office/powerpoint/2010/main" val="964599468"/>
+      </p:ext>
+    </p:extLst>
+  </p:cSld>
+  <p:clrMapOvr>
+    <a:masterClrMapping/>
+  </p:clrMapOvr>
+</p:notes>
 </file>
 
 <file path=ppt/slideLayouts/slideLayout1.xml><?xml version="1.0" encoding="utf-8"?>
@@ -1286,7 +1457,7 @@
           <a:p>
             <a:fld id="{8D2F9B37-4FC8-4EEB-BE2F-2081A1907109}" type="datetimeFigureOut">
               <a:rPr lang="en-US" smtClean="0"/>
-              <a:t>11/29/2017</a:t>
+              <a:t>11/29/17</a:t>
             </a:fld>
             <a:endParaRPr lang="en-US"/>
           </a:p>
@@ -1537,7 +1708,7 @@
           <a:p>
             <a:fld id="{8D2F9B37-4FC8-4EEB-BE2F-2081A1907109}" type="datetimeFigureOut">
               <a:rPr lang="en-US" smtClean="0"/>
-              <a:t>11/29/2017</a:t>
+              <a:t>11/29/17</a:t>
             </a:fld>
             <a:endParaRPr lang="en-US"/>
           </a:p>
@@ -1851,7 +2022,7 @@
           <a:p>
             <a:fld id="{8D2F9B37-4FC8-4EEB-BE2F-2081A1907109}" type="datetimeFigureOut">
               <a:rPr lang="en-US" smtClean="0"/>
-              <a:t>11/29/2017</a:t>
+              <a:t>11/29/17</a:t>
             </a:fld>
             <a:endParaRPr lang="en-US"/>
           </a:p>
@@ -2184,7 +2355,7 @@
           <a:p>
             <a:fld id="{8D2F9B37-4FC8-4EEB-BE2F-2081A1907109}" type="datetimeFigureOut">
               <a:rPr lang="en-US" smtClean="0"/>
-              <a:t>11/29/2017</a:t>
+              <a:t>11/29/17</a:t>
             </a:fld>
             <a:endParaRPr lang="en-US"/>
           </a:p>
@@ -2498,7 +2669,7 @@
           <a:p>
             <a:fld id="{8D2F9B37-4FC8-4EEB-BE2F-2081A1907109}" type="datetimeFigureOut">
               <a:rPr lang="en-US" smtClean="0"/>
-              <a:t>11/29/2017</a:t>
+              <a:t>11/29/17</a:t>
             </a:fld>
             <a:endParaRPr lang="en-US"/>
           </a:p>
@@ -2891,7 +3062,7 @@
           <a:p>
             <a:fld id="{8D2F9B37-4FC8-4EEB-BE2F-2081A1907109}" type="datetimeFigureOut">
               <a:rPr lang="en-US" smtClean="0"/>
-              <a:t>11/29/2017</a:t>
+              <a:t>11/29/17</a:t>
             </a:fld>
             <a:endParaRPr lang="en-US"/>
           </a:p>
@@ -3061,7 +3232,7 @@
           <a:p>
             <a:fld id="{8D2F9B37-4FC8-4EEB-BE2F-2081A1907109}" type="datetimeFigureOut">
               <a:rPr lang="en-US" smtClean="0"/>
-              <a:t>11/29/2017</a:t>
+              <a:t>11/29/17</a:t>
             </a:fld>
             <a:endParaRPr lang="en-US"/>
           </a:p>
@@ -3241,7 +3412,7 @@
           <a:p>
             <a:fld id="{8D2F9B37-4FC8-4EEB-BE2F-2081A1907109}" type="datetimeFigureOut">
               <a:rPr lang="en-US" smtClean="0"/>
-              <a:t>11/29/2017</a:t>
+              <a:t>11/29/17</a:t>
             </a:fld>
             <a:endParaRPr lang="en-US"/>
           </a:p>
@@ -3417,7 +3588,7 @@
           <a:p>
             <a:fld id="{8D2F9B37-4FC8-4EEB-BE2F-2081A1907109}" type="datetimeFigureOut">
               <a:rPr lang="en-US" smtClean="0"/>
-              <a:t>11/29/2017</a:t>
+              <a:t>11/29/17</a:t>
             </a:fld>
             <a:endParaRPr lang="en-US"/>
           </a:p>
@@ -3664,7 +3835,7 @@
           <a:p>
             <a:fld id="{8D2F9B37-4FC8-4EEB-BE2F-2081A1907109}" type="datetimeFigureOut">
               <a:rPr lang="en-US" smtClean="0"/>
-              <a:t>11/29/2017</a:t>
+              <a:t>11/29/17</a:t>
             </a:fld>
             <a:endParaRPr lang="en-US"/>
           </a:p>
@@ -3961,7 +4132,7 @@
           <a:p>
             <a:fld id="{8D2F9B37-4FC8-4EEB-BE2F-2081A1907109}" type="datetimeFigureOut">
               <a:rPr lang="en-US" smtClean="0"/>
-              <a:t>11/29/2017</a:t>
+              <a:t>11/29/17</a:t>
             </a:fld>
             <a:endParaRPr lang="en-US"/>
           </a:p>
@@ -4340,7 +4511,7 @@
           <a:p>
             <a:fld id="{8D2F9B37-4FC8-4EEB-BE2F-2081A1907109}" type="datetimeFigureOut">
               <a:rPr lang="en-US" smtClean="0"/>
-              <a:t>11/29/2017</a:t>
+              <a:t>11/29/17</a:t>
             </a:fld>
             <a:endParaRPr lang="en-US"/>
           </a:p>
@@ -4463,7 +4634,7 @@
           <a:p>
             <a:fld id="{8D2F9B37-4FC8-4EEB-BE2F-2081A1907109}" type="datetimeFigureOut">
               <a:rPr lang="en-US" smtClean="0"/>
-              <a:t>11/29/2017</a:t>
+              <a:t>11/29/17</a:t>
             </a:fld>
             <a:endParaRPr lang="en-US"/>
           </a:p>
@@ -4558,7 +4729,7 @@
           <a:p>
             <a:fld id="{8D2F9B37-4FC8-4EEB-BE2F-2081A1907109}" type="datetimeFigureOut">
               <a:rPr lang="en-US" smtClean="0"/>
-              <a:t>11/29/2017</a:t>
+              <a:t>11/29/17</a:t>
             </a:fld>
             <a:endParaRPr lang="en-US"/>
           </a:p>
@@ -4813,7 +4984,7 @@
           <a:p>
             <a:fld id="{8D2F9B37-4FC8-4EEB-BE2F-2081A1907109}" type="datetimeFigureOut">
               <a:rPr lang="en-US" smtClean="0"/>
-              <a:t>11/29/2017</a:t>
+              <a:t>11/29/17</a:t>
             </a:fld>
             <a:endParaRPr lang="en-US"/>
           </a:p>
@@ -5076,7 +5247,7 @@
           <a:p>
             <a:fld id="{8D2F9B37-4FC8-4EEB-BE2F-2081A1907109}" type="datetimeFigureOut">
               <a:rPr lang="en-US" smtClean="0"/>
-              <a:t>11/29/2017</a:t>
+              <a:t>11/29/17</a:t>
             </a:fld>
             <a:endParaRPr lang="en-US"/>
           </a:p>
@@ -5891,7 +6062,7 @@
           <a:p>
             <a:fld id="{8D2F9B37-4FC8-4EEB-BE2F-2081A1907109}" type="datetimeFigureOut">
               <a:rPr lang="en-US" smtClean="0"/>
-              <a:t>11/29/2017</a:t>
+              <a:t>11/29/17</a:t>
             </a:fld>
             <a:endParaRPr lang="en-US"/>
           </a:p>
@@ -6425,7 +6596,7 @@
           <p:cNvPr id="2" name="Title 1">
             <a:extLst>
               <a:ext uri="{FF2B5EF4-FFF2-40B4-BE49-F238E27FC236}">
-                <a16:creationId xmlns:a16="http://schemas.microsoft.com/office/drawing/2014/main" id="{E2A1A099-F8AF-492B-BE56-F120E0E56980}"/>
+                <a16:creationId xmlns:a16="http://schemas.microsoft.com/office/drawing/2014/main" xmlns="" id="{E2A1A099-F8AF-492B-BE56-F120E0E56980}"/>
               </a:ext>
             </a:extLst>
           </p:cNvPr>
@@ -6447,45 +6618,101 @@
           <a:lstStyle/>
           <a:p>
             <a:pPr algn="ctr"/>
+            <a:r>
+              <a:rPr lang="en-US" sz="4400" dirty="0"/>
+              <a:t/>
+            </a:r>
             <a:br>
               <a:rPr lang="en-US" sz="4400" dirty="0"/>
             </a:br>
+            <a:r>
+              <a:rPr lang="en-US" sz="4400" dirty="0"/>
+              <a:t/>
+            </a:r>
             <a:br>
               <a:rPr lang="en-US" sz="4400" dirty="0"/>
             </a:br>
+            <a:r>
+              <a:rPr lang="en-US" sz="4400" dirty="0"/>
+              <a:t/>
+            </a:r>
             <a:br>
               <a:rPr lang="en-US" sz="4400" dirty="0"/>
             </a:br>
+            <a:r>
+              <a:rPr lang="en-US" sz="4400" dirty="0"/>
+              <a:t/>
+            </a:r>
             <a:br>
               <a:rPr lang="en-US" sz="4400" dirty="0"/>
             </a:br>
+            <a:r>
+              <a:rPr lang="en-US" sz="4400" dirty="0"/>
+              <a:t/>
+            </a:r>
             <a:br>
               <a:rPr lang="en-US" sz="4400" dirty="0"/>
             </a:br>
+            <a:r>
+              <a:rPr lang="en-US" sz="4400" dirty="0"/>
+              <a:t/>
+            </a:r>
             <a:br>
               <a:rPr lang="en-US" sz="4400" dirty="0"/>
             </a:br>
+            <a:r>
+              <a:rPr lang="en-US" sz="4400" dirty="0"/>
+              <a:t/>
+            </a:r>
             <a:br>
               <a:rPr lang="en-US" sz="4400" dirty="0"/>
             </a:br>
+            <a:r>
+              <a:rPr lang="en-US" sz="4400" dirty="0"/>
+              <a:t/>
+            </a:r>
             <a:br>
               <a:rPr lang="en-US" sz="4400" dirty="0"/>
             </a:br>
+            <a:r>
+              <a:rPr lang="en-US" sz="4400" dirty="0"/>
+              <a:t/>
+            </a:r>
             <a:br>
               <a:rPr lang="en-US" sz="4400" dirty="0"/>
             </a:br>
+            <a:r>
+              <a:rPr lang="en-US" sz="4400" dirty="0"/>
+              <a:t/>
+            </a:r>
             <a:br>
               <a:rPr lang="en-US" sz="4400" dirty="0"/>
             </a:br>
+            <a:r>
+              <a:rPr lang="en-US" sz="4400" dirty="0"/>
+              <a:t/>
+            </a:r>
             <a:br>
               <a:rPr lang="en-US" sz="4400" dirty="0"/>
             </a:br>
+            <a:r>
+              <a:rPr lang="en-US" sz="4400" dirty="0"/>
+              <a:t/>
+            </a:r>
             <a:br>
               <a:rPr lang="en-US" sz="4400" dirty="0"/>
             </a:br>
+            <a:r>
+              <a:rPr lang="en-US" sz="4400" dirty="0"/>
+              <a:t/>
+            </a:r>
             <a:br>
               <a:rPr lang="en-US" sz="4400" dirty="0"/>
             </a:br>
+            <a:r>
+              <a:rPr lang="en-US" sz="4400" dirty="0"/>
+              <a:t/>
+            </a:r>
             <a:br>
               <a:rPr lang="en-US" sz="4400" dirty="0"/>
             </a:br>
@@ -6493,9 +6720,17 @@
               <a:rPr lang="en-US" sz="4400" dirty="0"/>
               <a:t>IBM Finish Line Challenge </a:t>
             </a:r>
+            <a:r>
+              <a:rPr lang="en-US" dirty="0"/>
+              <a:t/>
+            </a:r>
             <a:br>
               <a:rPr lang="en-US" dirty="0"/>
             </a:br>
+            <a:r>
+              <a:rPr lang="en-US" dirty="0"/>
+              <a:t/>
+            </a:r>
             <a:br>
               <a:rPr lang="en-US" dirty="0"/>
             </a:br>
@@ -6519,7 +6754,7 @@
           <p:cNvPr id="3" name="Subtitle 2">
             <a:extLst>
               <a:ext uri="{FF2B5EF4-FFF2-40B4-BE49-F238E27FC236}">
-                <a16:creationId xmlns:a16="http://schemas.microsoft.com/office/drawing/2014/main" id="{07F6A7EB-4B9B-42F8-9054-48ABF81993F7}"/>
+                <a16:creationId xmlns:a16="http://schemas.microsoft.com/office/drawing/2014/main" xmlns="" id="{07F6A7EB-4B9B-42F8-9054-48ABF81993F7}"/>
               </a:ext>
             </a:extLst>
           </p:cNvPr>
@@ -6590,7 +6825,7 @@
           <p:cNvPr id="2" name="Title 1">
             <a:extLst>
               <a:ext uri="{FF2B5EF4-FFF2-40B4-BE49-F238E27FC236}">
-                <a16:creationId xmlns:a16="http://schemas.microsoft.com/office/drawing/2014/main" id="{6E1A8408-C1FC-4D47-8F2B-25551BDF2B97}"/>
+                <a16:creationId xmlns="" xmlns:a16="http://schemas.microsoft.com/office/drawing/2014/main" id="{6E1A8408-C1FC-4D47-8F2B-25551BDF2B97}"/>
               </a:ext>
             </a:extLst>
           </p:cNvPr>
@@ -6608,7 +6843,7 @@
           <a:p>
             <a:r>
               <a:rPr lang="en-US" dirty="0"/>
-              <a:t>Financial Viability</a:t>
+              <a:t>Technical Challenges</a:t>
             </a:r>
           </a:p>
         </p:txBody>
@@ -6618,7 +6853,193 @@
           <p:cNvPr id="3" name="Content Placeholder 2">
             <a:extLst>
               <a:ext uri="{FF2B5EF4-FFF2-40B4-BE49-F238E27FC236}">
-                <a16:creationId xmlns:a16="http://schemas.microsoft.com/office/drawing/2014/main" id="{0E8E19FB-E60B-465D-B108-C003DDA0B568}"/>
+                <a16:creationId xmlns="" xmlns:a16="http://schemas.microsoft.com/office/drawing/2014/main" id="{0E8E19FB-E60B-465D-B108-C003DDA0B568}"/>
+              </a:ext>
+            </a:extLst>
+          </p:cNvPr>
+          <p:cNvSpPr>
+            <a:spLocks noGrp="1"/>
+          </p:cNvSpPr>
+          <p:nvPr>
+            <p:ph idx="1"/>
+          </p:nvPr>
+        </p:nvSpPr>
+        <p:spPr>
+          <a:xfrm>
+            <a:off x="609598" y="2160590"/>
+            <a:ext cx="6934201" cy="3880773"/>
+          </a:xfrm>
+        </p:spPr>
+        <p:txBody>
+          <a:bodyPr/>
+          <a:lstStyle/>
+          <a:p>
+            <a:r>
+              <a:rPr lang="en-US" sz="1600" dirty="0" smtClean="0"/>
+              <a:t>Collect </a:t>
+            </a:r>
+            <a:r>
+              <a:rPr lang="en-US" sz="1600" dirty="0"/>
+              <a:t>r</a:t>
+            </a:r>
+            <a:r>
+              <a:rPr lang="en-US" sz="1600" dirty="0" smtClean="0"/>
+              <a:t>eal-time </a:t>
+            </a:r>
+            <a:r>
+              <a:rPr lang="en-US" sz="1600" dirty="0" smtClean="0"/>
+              <a:t>prices </a:t>
+            </a:r>
+            <a:r>
+              <a:rPr lang="en-US" sz="1600" dirty="0" smtClean="0"/>
+              <a:t>with</a:t>
+            </a:r>
+            <a:r>
+              <a:rPr lang="en-US" sz="1600" dirty="0" smtClean="0"/>
+              <a:t> </a:t>
+            </a:r>
+            <a:r>
+              <a:rPr lang="en-US" sz="1600" dirty="0" smtClean="0"/>
+              <a:t>a web crawler for the </a:t>
+            </a:r>
+            <a:r>
+              <a:rPr lang="en-US" sz="1600" dirty="0"/>
+              <a:t>products</a:t>
+            </a:r>
+            <a:r>
+              <a:rPr lang="en-US" sz="1600" dirty="0" smtClean="0"/>
+              <a:t> </a:t>
+            </a:r>
+            <a:r>
+              <a:rPr lang="en-US" sz="1600" dirty="0" smtClean="0"/>
+              <a:t>hosted</a:t>
+            </a:r>
+          </a:p>
+          <a:p>
+            <a:endParaRPr lang="en-US" sz="1600" dirty="0" smtClean="0"/>
+          </a:p>
+          <a:p>
+            <a:r>
+              <a:rPr lang="en-US" sz="1600" dirty="0" smtClean="0"/>
+              <a:t>Integrate Database </a:t>
+            </a:r>
+            <a:r>
+              <a:rPr lang="en-US" sz="1600" dirty="0" smtClean="0"/>
+              <a:t>Service to the </a:t>
+            </a:r>
+            <a:r>
+              <a:rPr lang="en-US" sz="1600" dirty="0" smtClean="0"/>
+              <a:t>application:</a:t>
+            </a:r>
+          </a:p>
+          <a:p>
+            <a:pPr lvl="1"/>
+            <a:r>
+              <a:rPr lang="en-US" sz="1400" dirty="0" smtClean="0"/>
+              <a:t>IBM </a:t>
+            </a:r>
+            <a:r>
+              <a:rPr lang="en-US" sz="1400" dirty="0"/>
+              <a:t>Watson Discovery </a:t>
+            </a:r>
+            <a:r>
+              <a:rPr lang="en-US" sz="1400" dirty="0" smtClean="0"/>
+              <a:t>API</a:t>
+            </a:r>
+          </a:p>
+          <a:p>
+            <a:pPr lvl="1"/>
+            <a:r>
+              <a:rPr lang="en-US" sz="1400" dirty="0"/>
+              <a:t>Visual Recognition API in future</a:t>
+            </a:r>
+          </a:p>
+          <a:p>
+            <a:pPr>
+              <a:buFont typeface="Courier New" charset="0"/>
+              <a:buChar char="o"/>
+            </a:pPr>
+            <a:endParaRPr lang="en-US" dirty="0" smtClean="0"/>
+          </a:p>
+          <a:p>
+            <a:pPr marL="0" indent="0">
+              <a:buNone/>
+            </a:pPr>
+            <a:r>
+              <a:rPr lang="en-US" dirty="0" smtClean="0"/>
+              <a:t>	</a:t>
+            </a:r>
+            <a:endParaRPr lang="en-US" dirty="0"/>
+          </a:p>
+          <a:p>
+            <a:endParaRPr lang="en-US" dirty="0"/>
+          </a:p>
+        </p:txBody>
+      </p:sp>
+    </p:spTree>
+    <p:extLst>
+      <p:ext uri="{BB962C8B-B14F-4D97-AF65-F5344CB8AC3E}">
+        <p14:creationId xmlns:p14="http://schemas.microsoft.com/office/powerpoint/2010/main" val="623462683"/>
+      </p:ext>
+    </p:extLst>
+  </p:cSld>
+  <p:clrMapOvr>
+    <a:masterClrMapping/>
+  </p:clrMapOvr>
+</p:sld>
+</file>
+
+<file path=ppt/slides/slide11.xml><?xml version="1.0" encoding="utf-8"?>
+<p:sld xmlns:a="http://schemas.openxmlformats.org/drawingml/2006/main" xmlns:r="http://schemas.openxmlformats.org/officeDocument/2006/relationships" xmlns:p="http://schemas.openxmlformats.org/presentationml/2006/main">
+  <p:cSld>
+    <p:spTree>
+      <p:nvGrpSpPr>
+        <p:cNvPr id="1" name=""/>
+        <p:cNvGrpSpPr/>
+        <p:nvPr/>
+      </p:nvGrpSpPr>
+      <p:grpSpPr>
+        <a:xfrm>
+          <a:off x="0" y="0"/>
+          <a:ext cx="0" cy="0"/>
+          <a:chOff x="0" y="0"/>
+          <a:chExt cx="0" cy="0"/>
+        </a:xfrm>
+      </p:grpSpPr>
+      <p:sp>
+        <p:nvSpPr>
+          <p:cNvPr id="2" name="Title 1">
+            <a:extLst>
+              <a:ext uri="{FF2B5EF4-FFF2-40B4-BE49-F238E27FC236}">
+                <a16:creationId xmlns:a16="http://schemas.microsoft.com/office/drawing/2014/main" xmlns="" id="{6E1A8408-C1FC-4D47-8F2B-25551BDF2B97}"/>
+              </a:ext>
+            </a:extLst>
+          </p:cNvPr>
+          <p:cNvSpPr>
+            <a:spLocks noGrp="1"/>
+          </p:cNvSpPr>
+          <p:nvPr>
+            <p:ph type="title"/>
+          </p:nvPr>
+        </p:nvSpPr>
+        <p:spPr/>
+        <p:txBody>
+          <a:bodyPr/>
+          <a:lstStyle/>
+          <a:p>
+            <a:r>
+              <a:rPr lang="en-US" dirty="0"/>
+              <a:t>Financial Viability</a:t>
+            </a:r>
+          </a:p>
+        </p:txBody>
+      </p:sp>
+      <p:sp>
+        <p:nvSpPr>
+          <p:cNvPr id="3" name="Content Placeholder 2">
+            <a:extLst>
+              <a:ext uri="{FF2B5EF4-FFF2-40B4-BE49-F238E27FC236}">
+                <a16:creationId xmlns:a16="http://schemas.microsoft.com/office/drawing/2014/main" xmlns="" id="{0E8E19FB-E60B-465D-B108-C003DDA0B568}"/>
               </a:ext>
             </a:extLst>
           </p:cNvPr>
@@ -6718,7 +7139,7 @@
           <p:cNvPr id="4" name="Picture 3">
             <a:extLst>
               <a:ext uri="{FF2B5EF4-FFF2-40B4-BE49-F238E27FC236}">
-                <a16:creationId xmlns:a16="http://schemas.microsoft.com/office/drawing/2014/main" id="{F3B17938-214B-40E9-9969-983709355BE3}"/>
+                <a16:creationId xmlns:a16="http://schemas.microsoft.com/office/drawing/2014/main" xmlns="" id="{F3B17938-214B-40E9-9969-983709355BE3}"/>
               </a:ext>
             </a:extLst>
           </p:cNvPr>
@@ -6756,152 +7177,6 @@
 </p:sld>
 </file>
 
-<file path=ppt/slides/slide11.xml><?xml version="1.0" encoding="utf-8"?>
-<p:sld xmlns:a="http://schemas.openxmlformats.org/drawingml/2006/main" xmlns:r="http://schemas.openxmlformats.org/officeDocument/2006/relationships" xmlns:p="http://schemas.openxmlformats.org/presentationml/2006/main">
-  <p:cSld>
-    <p:spTree>
-      <p:nvGrpSpPr>
-        <p:cNvPr id="1" name=""/>
-        <p:cNvGrpSpPr/>
-        <p:nvPr/>
-      </p:nvGrpSpPr>
-      <p:grpSpPr>
-        <a:xfrm>
-          <a:off x="0" y="0"/>
-          <a:ext cx="0" cy="0"/>
-          <a:chOff x="0" y="0"/>
-          <a:chExt cx="0" cy="0"/>
-        </a:xfrm>
-      </p:grpSpPr>
-      <p:sp>
-        <p:nvSpPr>
-          <p:cNvPr id="2" name="Title 1">
-            <a:extLst>
-              <a:ext uri="{FF2B5EF4-FFF2-40B4-BE49-F238E27FC236}">
-                <a16:creationId xmlns:a16="http://schemas.microsoft.com/office/drawing/2014/main" id="{6E1A8408-C1FC-4D47-8F2B-25551BDF2B97}"/>
-              </a:ext>
-            </a:extLst>
-          </p:cNvPr>
-          <p:cNvSpPr>
-            <a:spLocks noGrp="1"/>
-          </p:cNvSpPr>
-          <p:nvPr>
-            <p:ph type="title"/>
-          </p:nvPr>
-        </p:nvSpPr>
-        <p:spPr/>
-        <p:txBody>
-          <a:bodyPr/>
-          <a:lstStyle/>
-          <a:p>
-            <a:r>
-              <a:rPr lang="en-US" dirty="0"/>
-              <a:t>Ask</a:t>
-            </a:r>
-          </a:p>
-        </p:txBody>
-      </p:sp>
-      <p:sp>
-        <p:nvSpPr>
-          <p:cNvPr id="3" name="Content Placeholder 2">
-            <a:extLst>
-              <a:ext uri="{FF2B5EF4-FFF2-40B4-BE49-F238E27FC236}">
-                <a16:creationId xmlns:a16="http://schemas.microsoft.com/office/drawing/2014/main" id="{0E8E19FB-E60B-465D-B108-C003DDA0B568}"/>
-              </a:ext>
-            </a:extLst>
-          </p:cNvPr>
-          <p:cNvSpPr>
-            <a:spLocks noGrp="1"/>
-          </p:cNvSpPr>
-          <p:nvPr>
-            <p:ph idx="1"/>
-          </p:nvPr>
-        </p:nvSpPr>
-        <p:spPr>
-          <a:xfrm>
-            <a:off x="609599" y="1752600"/>
-            <a:ext cx="6347714" cy="4288763"/>
-          </a:xfrm>
-        </p:spPr>
-        <p:txBody>
-          <a:bodyPr>
-            <a:normAutofit/>
-          </a:bodyPr>
-          <a:lstStyle/>
-          <a:p>
-            <a:endParaRPr lang="en-US" dirty="0"/>
-          </a:p>
-          <a:p>
-            <a:r>
-              <a:rPr lang="en-US" dirty="0"/>
-              <a:t>$200,000 for 10% stake in the company</a:t>
-            </a:r>
-          </a:p>
-          <a:p>
-            <a:r>
-              <a:rPr lang="en-US" dirty="0"/>
-              <a:t>5 founding members</a:t>
-            </a:r>
-          </a:p>
-          <a:p>
-            <a:pPr lvl="1"/>
-            <a:r>
-              <a:rPr lang="en-US" dirty="0"/>
-              <a:t>Team could expand to up to 10 people</a:t>
-            </a:r>
-          </a:p>
-          <a:p>
-            <a:endParaRPr lang="en-US" dirty="0"/>
-          </a:p>
-          <a:p>
-            <a:r>
-              <a:rPr lang="en-US" dirty="0"/>
-              <a:t>Profitability to IBM</a:t>
-            </a:r>
-          </a:p>
-          <a:p>
-            <a:pPr lvl="1"/>
-            <a:r>
-              <a:rPr lang="en-US" dirty="0"/>
-              <a:t>IBM Watson can harness consumer behavior and data</a:t>
-            </a:r>
-          </a:p>
-          <a:p>
-            <a:pPr lvl="1"/>
-            <a:r>
-              <a:rPr lang="en-US" dirty="0"/>
-              <a:t>Dictating the traffic through e-commerce world</a:t>
-            </a:r>
-          </a:p>
-          <a:p>
-            <a:pPr lvl="1"/>
-            <a:r>
-              <a:rPr lang="en-US" dirty="0"/>
-              <a:t>Potential profitability from e-commerce sales</a:t>
-            </a:r>
-          </a:p>
-          <a:p>
-            <a:pPr lvl="1"/>
-            <a:r>
-              <a:rPr lang="en-US" dirty="0"/>
-              <a:t>Good marketing and branding opportunity for IBM Watson and IBM Cloud services</a:t>
-            </a:r>
-          </a:p>
-        </p:txBody>
-      </p:sp>
-    </p:spTree>
-    <p:extLst>
-      <p:ext uri="{BB962C8B-B14F-4D97-AF65-F5344CB8AC3E}">
-        <p14:creationId xmlns:p14="http://schemas.microsoft.com/office/powerpoint/2010/main" val="1911603262"/>
-      </p:ext>
-    </p:extLst>
-  </p:cSld>
-  <p:clrMapOvr>
-    <a:masterClrMapping/>
-  </p:clrMapOvr>
-</p:sld>
-</file>
-
 <file path=ppt/slides/slide12.xml><?xml version="1.0" encoding="utf-8"?>
 <p:sld xmlns:a="http://schemas.openxmlformats.org/drawingml/2006/main" xmlns:r="http://schemas.openxmlformats.org/officeDocument/2006/relationships" xmlns:p="http://schemas.openxmlformats.org/presentationml/2006/main">
   <p:cSld>
@@ -6924,7 +7199,7 @@
           <p:cNvPr id="2" name="Title 1">
             <a:extLst>
               <a:ext uri="{FF2B5EF4-FFF2-40B4-BE49-F238E27FC236}">
-                <a16:creationId xmlns:a16="http://schemas.microsoft.com/office/drawing/2014/main" id="{6E1A8408-C1FC-4D47-8F2B-25551BDF2B97}"/>
+                <a16:creationId xmlns:a16="http://schemas.microsoft.com/office/drawing/2014/main" xmlns="" id="{6E1A8408-C1FC-4D47-8F2B-25551BDF2B97}"/>
               </a:ext>
             </a:extLst>
           </p:cNvPr>
@@ -6935,20 +7210,102 @@
             <p:ph type="title"/>
           </p:nvPr>
         </p:nvSpPr>
+        <p:spPr/>
+        <p:txBody>
+          <a:bodyPr/>
+          <a:lstStyle/>
+          <a:p>
+            <a:r>
+              <a:rPr lang="en-US" dirty="0"/>
+              <a:t>Ask</a:t>
+            </a:r>
+          </a:p>
+        </p:txBody>
+      </p:sp>
+      <p:sp>
+        <p:nvSpPr>
+          <p:cNvPr id="3" name="Content Placeholder 2">
+            <a:extLst>
+              <a:ext uri="{FF2B5EF4-FFF2-40B4-BE49-F238E27FC236}">
+                <a16:creationId xmlns:a16="http://schemas.microsoft.com/office/drawing/2014/main" xmlns="" id="{0E8E19FB-E60B-465D-B108-C003DDA0B568}"/>
+              </a:ext>
+            </a:extLst>
+          </p:cNvPr>
+          <p:cNvSpPr>
+            <a:spLocks noGrp="1"/>
+          </p:cNvSpPr>
+          <p:nvPr>
+            <p:ph idx="1"/>
+          </p:nvPr>
+        </p:nvSpPr>
         <p:spPr>
           <a:xfrm>
-            <a:off x="685800" y="2667000"/>
-            <a:ext cx="6347713" cy="1320800"/>
+            <a:off x="609599" y="1752600"/>
+            <a:ext cx="6347714" cy="4288763"/>
           </a:xfrm>
         </p:spPr>
         <p:txBody>
-          <a:bodyPr/>
+          <a:bodyPr>
+            <a:normAutofit/>
+          </a:bodyPr>
           <a:lstStyle/>
           <a:p>
-            <a:pPr algn="ctr"/>
+            <a:endParaRPr lang="en-US" dirty="0"/>
+          </a:p>
+          <a:p>
             <a:r>
               <a:rPr lang="en-US" dirty="0"/>
-              <a:t>Questions?</a:t>
+              <a:t>$200,000 for 10% stake in the company</a:t>
+            </a:r>
+          </a:p>
+          <a:p>
+            <a:r>
+              <a:rPr lang="en-US" dirty="0"/>
+              <a:t>5 founding members</a:t>
+            </a:r>
+          </a:p>
+          <a:p>
+            <a:pPr lvl="1"/>
+            <a:r>
+              <a:rPr lang="en-US" dirty="0"/>
+              <a:t>Team could expand to up to 10 people</a:t>
+            </a:r>
+          </a:p>
+          <a:p>
+            <a:endParaRPr lang="en-US" dirty="0"/>
+          </a:p>
+          <a:p>
+            <a:r>
+              <a:rPr lang="en-US" dirty="0"/>
+              <a:t>Profitability to IBM</a:t>
+            </a:r>
+          </a:p>
+          <a:p>
+            <a:pPr lvl="1"/>
+            <a:r>
+              <a:rPr lang="en-US" dirty="0"/>
+              <a:t>IBM Watson can harness consumer behavior and data</a:t>
+            </a:r>
+          </a:p>
+          <a:p>
+            <a:pPr lvl="1"/>
+            <a:r>
+              <a:rPr lang="en-US" dirty="0"/>
+              <a:t>Dictating the traffic through e-commerce world</a:t>
+            </a:r>
+          </a:p>
+          <a:p>
+            <a:pPr lvl="1"/>
+            <a:r>
+              <a:rPr lang="en-US" dirty="0"/>
+              <a:t>Potential profitability from e-commerce sales</a:t>
+            </a:r>
+          </a:p>
+          <a:p>
+            <a:pPr lvl="1"/>
+            <a:r>
+              <a:rPr lang="en-US" dirty="0"/>
+              <a:t>Good marketing and branding opportunity for IBM Watson and IBM Cloud services</a:t>
             </a:r>
           </a:p>
         </p:txBody>
@@ -6956,7 +7313,7 @@
     </p:spTree>
     <p:extLst>
       <p:ext uri="{BB962C8B-B14F-4D97-AF65-F5344CB8AC3E}">
-        <p14:creationId xmlns:p14="http://schemas.microsoft.com/office/powerpoint/2010/main" val="2587019108"/>
+        <p14:creationId xmlns:p14="http://schemas.microsoft.com/office/powerpoint/2010/main" val="1911603262"/>
       </p:ext>
     </p:extLst>
   </p:cSld>
@@ -6988,7 +7345,71 @@
           <p:cNvPr id="2" name="Title 1">
             <a:extLst>
               <a:ext uri="{FF2B5EF4-FFF2-40B4-BE49-F238E27FC236}">
-                <a16:creationId xmlns:a16="http://schemas.microsoft.com/office/drawing/2014/main" id="{6E1A8408-C1FC-4D47-8F2B-25551BDF2B97}"/>
+                <a16:creationId xmlns:a16="http://schemas.microsoft.com/office/drawing/2014/main" xmlns="" id="{6E1A8408-C1FC-4D47-8F2B-25551BDF2B97}"/>
+              </a:ext>
+            </a:extLst>
+          </p:cNvPr>
+          <p:cNvSpPr>
+            <a:spLocks noGrp="1"/>
+          </p:cNvSpPr>
+          <p:nvPr>
+            <p:ph type="title"/>
+          </p:nvPr>
+        </p:nvSpPr>
+        <p:spPr>
+          <a:xfrm>
+            <a:off x="685800" y="2667000"/>
+            <a:ext cx="6347713" cy="1320800"/>
+          </a:xfrm>
+        </p:spPr>
+        <p:txBody>
+          <a:bodyPr/>
+          <a:lstStyle/>
+          <a:p>
+            <a:pPr algn="ctr"/>
+            <a:r>
+              <a:rPr lang="en-US" dirty="0"/>
+              <a:t>Questions?</a:t>
+            </a:r>
+          </a:p>
+        </p:txBody>
+      </p:sp>
+    </p:spTree>
+    <p:extLst>
+      <p:ext uri="{BB962C8B-B14F-4D97-AF65-F5344CB8AC3E}">
+        <p14:creationId xmlns:p14="http://schemas.microsoft.com/office/powerpoint/2010/main" val="2587019108"/>
+      </p:ext>
+    </p:extLst>
+  </p:cSld>
+  <p:clrMapOvr>
+    <a:masterClrMapping/>
+  </p:clrMapOvr>
+</p:sld>
+</file>
+
+<file path=ppt/slides/slide14.xml><?xml version="1.0" encoding="utf-8"?>
+<p:sld xmlns:a="http://schemas.openxmlformats.org/drawingml/2006/main" xmlns:r="http://schemas.openxmlformats.org/officeDocument/2006/relationships" xmlns:p="http://schemas.openxmlformats.org/presentationml/2006/main">
+  <p:cSld>
+    <p:spTree>
+      <p:nvGrpSpPr>
+        <p:cNvPr id="1" name=""/>
+        <p:cNvGrpSpPr/>
+        <p:nvPr/>
+      </p:nvGrpSpPr>
+      <p:grpSpPr>
+        <a:xfrm>
+          <a:off x="0" y="0"/>
+          <a:ext cx="0" cy="0"/>
+          <a:chOff x="0" y="0"/>
+          <a:chExt cx="0" cy="0"/>
+        </a:xfrm>
+      </p:grpSpPr>
+      <p:sp>
+        <p:nvSpPr>
+          <p:cNvPr id="2" name="Title 1">
+            <a:extLst>
+              <a:ext uri="{FF2B5EF4-FFF2-40B4-BE49-F238E27FC236}">
+                <a16:creationId xmlns:a16="http://schemas.microsoft.com/office/drawing/2014/main" xmlns="" id="{6E1A8408-C1FC-4D47-8F2B-25551BDF2B97}"/>
               </a:ext>
             </a:extLst>
           </p:cNvPr>
@@ -7052,7 +7473,7 @@
           <p:cNvPr id="2" name="Title 1">
             <a:extLst>
               <a:ext uri="{FF2B5EF4-FFF2-40B4-BE49-F238E27FC236}">
-                <a16:creationId xmlns:a16="http://schemas.microsoft.com/office/drawing/2014/main" id="{3188D881-550A-41E6-A87E-293AA0FE7C23}"/>
+                <a16:creationId xmlns:a16="http://schemas.microsoft.com/office/drawing/2014/main" xmlns="" id="{3188D881-550A-41E6-A87E-293AA0FE7C23}"/>
               </a:ext>
             </a:extLst>
           </p:cNvPr>
@@ -7085,7 +7506,7 @@
           <p:cNvPr id="6" name="TextBox 5">
             <a:extLst>
               <a:ext uri="{FF2B5EF4-FFF2-40B4-BE49-F238E27FC236}">
-                <a16:creationId xmlns:a16="http://schemas.microsoft.com/office/drawing/2014/main" id="{D0480103-D79A-491B-A532-E087DBC9A8BD}"/>
+                <a16:creationId xmlns:a16="http://schemas.microsoft.com/office/drawing/2014/main" xmlns="" id="{D0480103-D79A-491B-A532-E087DBC9A8BD}"/>
               </a:ext>
             </a:extLst>
           </p:cNvPr>
@@ -7127,7 +7548,7 @@
           <p:cNvPr id="7" name="TextBox 6">
             <a:extLst>
               <a:ext uri="{FF2B5EF4-FFF2-40B4-BE49-F238E27FC236}">
-                <a16:creationId xmlns:a16="http://schemas.microsoft.com/office/drawing/2014/main" id="{EA911CD3-AC9B-4D41-AECF-649D5D7DFB63}"/>
+                <a16:creationId xmlns:a16="http://schemas.microsoft.com/office/drawing/2014/main" xmlns="" id="{EA911CD3-AC9B-4D41-AECF-649D5D7DFB63}"/>
               </a:ext>
             </a:extLst>
           </p:cNvPr>
@@ -7159,7 +7580,7 @@
           <p:cNvPr id="19" name="Picture 18" descr="A person wearing a suit and tie standing in front of a mountain&#10;&#10;Description generated with very high confidence">
             <a:extLst>
               <a:ext uri="{FF2B5EF4-FFF2-40B4-BE49-F238E27FC236}">
-                <a16:creationId xmlns:a16="http://schemas.microsoft.com/office/drawing/2014/main" id="{4149E916-6496-4963-B969-F84B8CFC655B}"/>
+                <a16:creationId xmlns:a16="http://schemas.microsoft.com/office/drawing/2014/main" xmlns="" id="{4149E916-6496-4963-B969-F84B8CFC655B}"/>
               </a:ext>
             </a:extLst>
           </p:cNvPr>
@@ -7219,7 +7640,7 @@
           <p:cNvPr id="21" name="Picture 20" descr="A person smiling for the camera&#10;&#10;Description generated with very high confidence">
             <a:extLst>
               <a:ext uri="{FF2B5EF4-FFF2-40B4-BE49-F238E27FC236}">
-                <a16:creationId xmlns:a16="http://schemas.microsoft.com/office/drawing/2014/main" id="{A5BF7E92-F55B-4340-829D-55D589957F02}"/>
+                <a16:creationId xmlns:a16="http://schemas.microsoft.com/office/drawing/2014/main" xmlns="" id="{A5BF7E92-F55B-4340-829D-55D589957F02}"/>
               </a:ext>
             </a:extLst>
           </p:cNvPr>
@@ -7279,7 +7700,7 @@
           <p:cNvPr id="23" name="Picture 22" descr="A person standing in front of a building&#10;&#10;Description generated with very high confidence">
             <a:extLst>
               <a:ext uri="{FF2B5EF4-FFF2-40B4-BE49-F238E27FC236}">
-                <a16:creationId xmlns:a16="http://schemas.microsoft.com/office/drawing/2014/main" id="{55AFD24E-0D23-475A-8512-1F0A5195FAF0}"/>
+                <a16:creationId xmlns:a16="http://schemas.microsoft.com/office/drawing/2014/main" xmlns="" id="{55AFD24E-0D23-475A-8512-1F0A5195FAF0}"/>
               </a:ext>
             </a:extLst>
           </p:cNvPr>
@@ -7339,7 +7760,7 @@
           <p:cNvPr id="25" name="Picture 24" descr="A person smiling for the camera&#10;&#10;Description generated with very high confidence">
             <a:extLst>
               <a:ext uri="{FF2B5EF4-FFF2-40B4-BE49-F238E27FC236}">
-                <a16:creationId xmlns:a16="http://schemas.microsoft.com/office/drawing/2014/main" id="{F9837DF5-FA52-4FDE-B184-005CAC1DB9A2}"/>
+                <a16:creationId xmlns:a16="http://schemas.microsoft.com/office/drawing/2014/main" xmlns="" id="{F9837DF5-FA52-4FDE-B184-005CAC1DB9A2}"/>
               </a:ext>
             </a:extLst>
           </p:cNvPr>
@@ -7399,7 +7820,7 @@
           <p:cNvPr id="27" name="Picture 26" descr="A person posing for the camera&#10;&#10;Description generated with very high confidence">
             <a:extLst>
               <a:ext uri="{FF2B5EF4-FFF2-40B4-BE49-F238E27FC236}">
-                <a16:creationId xmlns:a16="http://schemas.microsoft.com/office/drawing/2014/main" id="{9E43DA31-7EB1-4E8B-B3F2-B1DDAB347C17}"/>
+                <a16:creationId xmlns:a16="http://schemas.microsoft.com/office/drawing/2014/main" xmlns="" id="{9E43DA31-7EB1-4E8B-B3F2-B1DDAB347C17}"/>
               </a:ext>
             </a:extLst>
           </p:cNvPr>
@@ -7459,7 +7880,7 @@
           <p:cNvPr id="28" name="TextBox 27">
             <a:extLst>
               <a:ext uri="{FF2B5EF4-FFF2-40B4-BE49-F238E27FC236}">
-                <a16:creationId xmlns:a16="http://schemas.microsoft.com/office/drawing/2014/main" id="{5D619666-7BBB-47FA-8EAF-B4CA7335AD95}"/>
+                <a16:creationId xmlns:a16="http://schemas.microsoft.com/office/drawing/2014/main" xmlns="" id="{5D619666-7BBB-47FA-8EAF-B4CA7335AD95}"/>
               </a:ext>
             </a:extLst>
           </p:cNvPr>
@@ -7511,7 +7932,7 @@
           <p:cNvPr id="29" name="TextBox 28">
             <a:extLst>
               <a:ext uri="{FF2B5EF4-FFF2-40B4-BE49-F238E27FC236}">
-                <a16:creationId xmlns:a16="http://schemas.microsoft.com/office/drawing/2014/main" id="{6C2C4A43-E148-4BA9-A330-5B6C5DBA5703}"/>
+                <a16:creationId xmlns:a16="http://schemas.microsoft.com/office/drawing/2014/main" xmlns="" id="{6C2C4A43-E148-4BA9-A330-5B6C5DBA5703}"/>
               </a:ext>
             </a:extLst>
           </p:cNvPr>
@@ -7554,7 +7975,7 @@
           <p:cNvPr id="30" name="TextBox 29">
             <a:extLst>
               <a:ext uri="{FF2B5EF4-FFF2-40B4-BE49-F238E27FC236}">
-                <a16:creationId xmlns:a16="http://schemas.microsoft.com/office/drawing/2014/main" id="{9A30CE70-C767-475D-9A05-175D9DBED8F9}"/>
+                <a16:creationId xmlns:a16="http://schemas.microsoft.com/office/drawing/2014/main" xmlns="" id="{9A30CE70-C767-475D-9A05-175D9DBED8F9}"/>
               </a:ext>
             </a:extLst>
           </p:cNvPr>
@@ -7602,7 +8023,7 @@
           <p:cNvPr id="31" name="TextBox 30">
             <a:extLst>
               <a:ext uri="{FF2B5EF4-FFF2-40B4-BE49-F238E27FC236}">
-                <a16:creationId xmlns:a16="http://schemas.microsoft.com/office/drawing/2014/main" id="{33D41E7E-E77C-42FA-A120-C910A10C8182}"/>
+                <a16:creationId xmlns:a16="http://schemas.microsoft.com/office/drawing/2014/main" xmlns="" id="{33D41E7E-E77C-42FA-A120-C910A10C8182}"/>
               </a:ext>
             </a:extLst>
           </p:cNvPr>
@@ -7680,7 +8101,7 @@
           <p:cNvPr id="2" name="Title 1">
             <a:extLst>
               <a:ext uri="{FF2B5EF4-FFF2-40B4-BE49-F238E27FC236}">
-                <a16:creationId xmlns:a16="http://schemas.microsoft.com/office/drawing/2014/main" id="{3188D881-550A-41E6-A87E-293AA0FE7C23}"/>
+                <a16:creationId xmlns:a16="http://schemas.microsoft.com/office/drawing/2014/main" xmlns="" id="{3188D881-550A-41E6-A87E-293AA0FE7C23}"/>
               </a:ext>
             </a:extLst>
           </p:cNvPr>
@@ -7708,7 +8129,7 @@
           <p:cNvPr id="3" name="Content Placeholder 2">
             <a:extLst>
               <a:ext uri="{FF2B5EF4-FFF2-40B4-BE49-F238E27FC236}">
-                <a16:creationId xmlns:a16="http://schemas.microsoft.com/office/drawing/2014/main" id="{62CD92CC-4728-42D6-8460-6A5E60E3DA0E}"/>
+                <a16:creationId xmlns:a16="http://schemas.microsoft.com/office/drawing/2014/main" xmlns="" id="{62CD92CC-4728-42D6-8460-6A5E60E3DA0E}"/>
               </a:ext>
             </a:extLst>
           </p:cNvPr>
@@ -7842,7 +8263,7 @@
           <p:cNvPr id="2" name="Title 1">
             <a:extLst>
               <a:ext uri="{FF2B5EF4-FFF2-40B4-BE49-F238E27FC236}">
-                <a16:creationId xmlns:a16="http://schemas.microsoft.com/office/drawing/2014/main" id="{6E1A8408-C1FC-4D47-8F2B-25551BDF2B97}"/>
+                <a16:creationId xmlns:a16="http://schemas.microsoft.com/office/drawing/2014/main" xmlns="" id="{6E1A8408-C1FC-4D47-8F2B-25551BDF2B97}"/>
               </a:ext>
             </a:extLst>
           </p:cNvPr>
@@ -7870,7 +8291,7 @@
           <p:cNvPr id="6" name="Content Placeholder 5">
             <a:extLst>
               <a:ext uri="{FF2B5EF4-FFF2-40B4-BE49-F238E27FC236}">
-                <a16:creationId xmlns:a16="http://schemas.microsoft.com/office/drawing/2014/main" id="{BB739F05-A5CA-437E-A958-54F2F82E8214}"/>
+                <a16:creationId xmlns:a16="http://schemas.microsoft.com/office/drawing/2014/main" xmlns="" id="{BB739F05-A5CA-437E-A958-54F2F82E8214}"/>
               </a:ext>
             </a:extLst>
           </p:cNvPr>
@@ -7889,7 +8310,7 @@
         </p:spPr>
         <p:txBody>
           <a:bodyPr>
-            <a:normAutofit lnSpcReduction="10000"/>
+            <a:normAutofit fontScale="92500" lnSpcReduction="10000"/>
           </a:bodyPr>
           <a:lstStyle/>
           <a:p>
@@ -7923,8 +8344,20 @@
             <a:pPr lvl="1"/>
             <a:r>
               <a:rPr lang="en-US" dirty="0"/>
-              <a:t>Health Insurance assistant</a:t>
-            </a:r>
+              <a:t>Health Insurance </a:t>
+            </a:r>
+            <a:r>
+              <a:rPr lang="en-US" dirty="0" smtClean="0"/>
+              <a:t>Assistant</a:t>
+            </a:r>
+          </a:p>
+          <a:p>
+            <a:pPr lvl="1"/>
+            <a:r>
+              <a:rPr lang="en-US" dirty="0" smtClean="0"/>
+              <a:t>Meeting Transcripts Generation</a:t>
+            </a:r>
+            <a:endParaRPr lang="en-US" dirty="0"/>
           </a:p>
           <a:p>
             <a:endParaRPr lang="en-US" dirty="0"/>
@@ -8795,24 +9228,25 @@
                 <a:latin typeface="Arial" pitchFamily="34" charset="0"/>
                 <a:cs typeface="Arial" pitchFamily="34" charset="0"/>
               </a:rPr>
-              <a:t>Key Metrics</a:t>
-            </a:r>
-          </a:p>
-          <a:p>
-            <a:pPr marL="228600" indent="-228600">
-              <a:buFont typeface="+mj-lt"/>
-              <a:buAutoNum type="arabicPeriod"/>
-            </a:pPr>
-            <a:r>
-              <a:rPr lang="en-US" sz="1200" dirty="0">
+              <a:t>Key </a:t>
+            </a:r>
+            <a:r>
+              <a:rPr lang="en-US" sz="1400" b="1" dirty="0" smtClean="0">
                 <a:solidFill>
                   <a:schemeClr val="tx1"/>
                 </a:solidFill>
                 <a:latin typeface="Arial" pitchFamily="34" charset="0"/>
                 <a:cs typeface="Arial" pitchFamily="34" charset="0"/>
               </a:rPr>
-              <a:t>User Views</a:t>
-            </a:r>
+              <a:t>Metrics</a:t>
+            </a:r>
+            <a:endParaRPr lang="en-US" sz="1200" dirty="0">
+              <a:solidFill>
+                <a:schemeClr val="tx1"/>
+              </a:solidFill>
+              <a:latin typeface="Arial" pitchFamily="34" charset="0"/>
+              <a:cs typeface="Arial" pitchFamily="34" charset="0"/>
+            </a:endParaRPr>
           </a:p>
           <a:p>
             <a:pPr marL="228600" indent="-228600">
@@ -9579,7 +10013,7 @@
           <p:cNvPr id="20" name="Content Placeholder 3">
             <a:extLst>
               <a:ext uri="{FF2B5EF4-FFF2-40B4-BE49-F238E27FC236}">
-                <a16:creationId xmlns:a16="http://schemas.microsoft.com/office/drawing/2014/main" id="{3FA67D4D-93C6-4E8C-9CA5-553585E04A1C}"/>
+                <a16:creationId xmlns:a16="http://schemas.microsoft.com/office/drawing/2014/main" xmlns="" id="{3FA67D4D-93C6-4E8C-9CA5-553585E04A1C}"/>
               </a:ext>
             </a:extLst>
           </p:cNvPr>
@@ -9609,7 +10043,7 @@
           <p:cNvPr id="2" name="Title 1">
             <a:extLst>
               <a:ext uri="{FF2B5EF4-FFF2-40B4-BE49-F238E27FC236}">
-                <a16:creationId xmlns:a16="http://schemas.microsoft.com/office/drawing/2014/main" id="{6E1A8408-C1FC-4D47-8F2B-25551BDF2B97}"/>
+                <a16:creationId xmlns:a16="http://schemas.microsoft.com/office/drawing/2014/main" xmlns="" id="{6E1A8408-C1FC-4D47-8F2B-25551BDF2B97}"/>
               </a:ext>
             </a:extLst>
           </p:cNvPr>
@@ -9753,7 +10187,7 @@
           <p:cNvPr id="2" name="Title 1">
             <a:extLst>
               <a:ext uri="{FF2B5EF4-FFF2-40B4-BE49-F238E27FC236}">
-                <a16:creationId xmlns:a16="http://schemas.microsoft.com/office/drawing/2014/main" id="{6E1A8408-C1FC-4D47-8F2B-25551BDF2B97}"/>
+                <a16:creationId xmlns:a16="http://schemas.microsoft.com/office/drawing/2014/main" xmlns="" id="{6E1A8408-C1FC-4D47-8F2B-25551BDF2B97}"/>
               </a:ext>
             </a:extLst>
           </p:cNvPr>
@@ -9781,7 +10215,7 @@
           <p:cNvPr id="3" name="Content Placeholder 2">
             <a:extLst>
               <a:ext uri="{FF2B5EF4-FFF2-40B4-BE49-F238E27FC236}">
-                <a16:creationId xmlns:a16="http://schemas.microsoft.com/office/drawing/2014/main" id="{0E8E19FB-E60B-465D-B108-C003DDA0B568}"/>
+                <a16:creationId xmlns:a16="http://schemas.microsoft.com/office/drawing/2014/main" xmlns="" id="{0E8E19FB-E60B-465D-B108-C003DDA0B568}"/>
               </a:ext>
             </a:extLst>
           </p:cNvPr>
@@ -9895,7 +10329,7 @@
           <p:cNvPr id="2" name="Title 1">
             <a:extLst>
               <a:ext uri="{FF2B5EF4-FFF2-40B4-BE49-F238E27FC236}">
-                <a16:creationId xmlns:a16="http://schemas.microsoft.com/office/drawing/2014/main" id="{6E1A8408-C1FC-4D47-8F2B-25551BDF2B97}"/>
+                <a16:creationId xmlns:a16="http://schemas.microsoft.com/office/drawing/2014/main" xmlns="" id="{6E1A8408-C1FC-4D47-8F2B-25551BDF2B97}"/>
               </a:ext>
             </a:extLst>
           </p:cNvPr>
@@ -9928,7 +10362,7 @@
           <p:cNvPr id="3" name="Content Placeholder 2">
             <a:extLst>
               <a:ext uri="{FF2B5EF4-FFF2-40B4-BE49-F238E27FC236}">
-                <a16:creationId xmlns:a16="http://schemas.microsoft.com/office/drawing/2014/main" id="{0E8E19FB-E60B-465D-B108-C003DDA0B568}"/>
+                <a16:creationId xmlns:a16="http://schemas.microsoft.com/office/drawing/2014/main" xmlns="" id="{0E8E19FB-E60B-465D-B108-C003DDA0B568}"/>
               </a:ext>
             </a:extLst>
           </p:cNvPr>
@@ -10068,7 +10502,7 @@
           <p:cNvPr id="2" name="Title 1">
             <a:extLst>
               <a:ext uri="{FF2B5EF4-FFF2-40B4-BE49-F238E27FC236}">
-                <a16:creationId xmlns:a16="http://schemas.microsoft.com/office/drawing/2014/main" id="{6E1A8408-C1FC-4D47-8F2B-25551BDF2B97}"/>
+                <a16:creationId xmlns:a16="http://schemas.microsoft.com/office/drawing/2014/main" xmlns="" id="{6E1A8408-C1FC-4D47-8F2B-25551BDF2B97}"/>
               </a:ext>
             </a:extLst>
           </p:cNvPr>
@@ -10079,14 +10513,19 @@
             <p:ph type="title"/>
           </p:nvPr>
         </p:nvSpPr>
-        <p:spPr/>
+        <p:spPr>
+          <a:xfrm>
+            <a:off x="609599" y="609600"/>
+            <a:ext cx="6347713" cy="1320800"/>
+          </a:xfrm>
+        </p:spPr>
         <p:txBody>
           <a:bodyPr/>
           <a:lstStyle/>
           <a:p>
             <a:r>
               <a:rPr lang="en-US" dirty="0"/>
-              <a:t>Technical Challenges</a:t>
+              <a:t>Future Expectations</a:t>
             </a:r>
           </a:p>
         </p:txBody>
@@ -10096,7 +10535,7 @@
           <p:cNvPr id="3" name="Content Placeholder 2">
             <a:extLst>
               <a:ext uri="{FF2B5EF4-FFF2-40B4-BE49-F238E27FC236}">
-                <a16:creationId xmlns:a16="http://schemas.microsoft.com/office/drawing/2014/main" id="{0E8E19FB-E60B-465D-B108-C003DDA0B568}"/>
+                <a16:creationId xmlns:a16="http://schemas.microsoft.com/office/drawing/2014/main" xmlns="" id="{0E8E19FB-E60B-465D-B108-C003DDA0B568}"/>
               </a:ext>
             </a:extLst>
           </p:cNvPr>
@@ -10107,22 +10546,198 @@
             <p:ph idx="1"/>
           </p:nvPr>
         </p:nvSpPr>
-        <p:spPr/>
-        <p:txBody>
-          <a:bodyPr/>
+        <p:spPr>
+          <a:xfrm>
+            <a:off x="609599" y="1382697"/>
+            <a:ext cx="6858002" cy="4876800"/>
+          </a:xfrm>
+        </p:spPr>
+        <p:txBody>
+          <a:bodyPr>
+            <a:noAutofit/>
+          </a:bodyPr>
           <a:lstStyle/>
           <a:p>
+            <a:r>
+              <a:rPr lang="en-US" sz="1600" dirty="0" smtClean="0"/>
+              <a:t>Consumers</a:t>
+            </a:r>
+          </a:p>
+          <a:p>
+            <a:pPr lvl="1"/>
+            <a:r>
+              <a:rPr lang="en-US" sz="1400" dirty="0" smtClean="0"/>
+              <a:t>expand </a:t>
+            </a:r>
+            <a:r>
+              <a:rPr lang="en-US" sz="1400" dirty="0"/>
+              <a:t>the available products for </a:t>
+            </a:r>
+            <a:r>
+              <a:rPr lang="en-US" sz="1400" dirty="0" smtClean="0"/>
+              <a:t>search</a:t>
+            </a:r>
+          </a:p>
+          <a:p>
+            <a:pPr lvl="1"/>
+            <a:r>
+              <a:rPr lang="en-US" sz="1400" dirty="0" smtClean="0"/>
+              <a:t>expand </a:t>
+            </a:r>
+            <a:r>
+              <a:rPr lang="en-US" sz="1400" dirty="0"/>
+              <a:t>the pricing sources for the same product </a:t>
+            </a:r>
+            <a:endParaRPr lang="en-US" sz="1400" dirty="0" smtClean="0"/>
+          </a:p>
+          <a:p>
+            <a:pPr lvl="1"/>
+            <a:r>
+              <a:rPr lang="en-US" sz="1400" dirty="0" smtClean="0"/>
+              <a:t>analyze </a:t>
+            </a:r>
+            <a:r>
+              <a:rPr lang="en-US" sz="1400" dirty="0"/>
+              <a:t>consumer behaviors from the historical conversation data	Watson Toner Analyzer for Sentiment </a:t>
+            </a:r>
+            <a:r>
+              <a:rPr lang="en-US" sz="1400" dirty="0" smtClean="0"/>
+              <a:t>Analysis</a:t>
+            </a:r>
+          </a:p>
+          <a:p>
+            <a:pPr lvl="1"/>
+            <a:r>
+              <a:rPr lang="en-US" sz="1400" dirty="0" smtClean="0"/>
+              <a:t>enable </a:t>
+            </a:r>
+            <a:r>
+              <a:rPr lang="en-US" sz="1400" dirty="0"/>
+              <a:t>low price subscription </a:t>
+            </a:r>
+            <a:r>
+              <a:rPr lang="en-US" sz="1400" dirty="0" smtClean="0"/>
+              <a:t>alert</a:t>
+            </a:r>
+          </a:p>
+          <a:p>
+            <a:pPr lvl="1"/>
+            <a:r>
+              <a:rPr lang="en-US" sz="1400" dirty="0" smtClean="0"/>
+              <a:t>enable </a:t>
+            </a:r>
+            <a:r>
+              <a:rPr lang="en-US" sz="1400" dirty="0"/>
+              <a:t>image input from consumers	</a:t>
+            </a:r>
+            <a:r>
+              <a:rPr lang="en-US" sz="1400" dirty="0" smtClean="0"/>
+              <a:t>(Watson </a:t>
+            </a:r>
+            <a:r>
+              <a:rPr lang="en-US" sz="1400" dirty="0"/>
+              <a:t>Visual Recognition </a:t>
+            </a:r>
+            <a:r>
+              <a:rPr lang="en-US" sz="1400" dirty="0" smtClean="0"/>
+              <a:t>API)</a:t>
+            </a:r>
+            <a:endParaRPr lang="en-US" sz="1400" dirty="0"/>
+          </a:p>
+          <a:p>
+            <a:r>
+              <a:rPr lang="en-US" sz="1600" dirty="0" smtClean="0"/>
+              <a:t>Retailer</a:t>
+            </a:r>
+          </a:p>
+          <a:p>
+            <a:pPr lvl="1"/>
+            <a:r>
+              <a:rPr lang="en-US" sz="1400" dirty="0" smtClean="0"/>
+              <a:t>Basic Version</a:t>
+            </a:r>
+          </a:p>
+          <a:p>
+            <a:pPr lvl="2"/>
+            <a:r>
+              <a:rPr lang="en-US" dirty="0"/>
+              <a:t>provide </a:t>
+            </a:r>
+            <a:r>
+              <a:rPr lang="en-US" dirty="0"/>
+              <a:t>a separate interface for </a:t>
+            </a:r>
+            <a:r>
+              <a:rPr lang="en-US" dirty="0" smtClean="0"/>
+              <a:t>retailers</a:t>
+            </a:r>
             <a:endParaRPr lang="en-US" dirty="0"/>
           </a:p>
           <a:p>
-            <a:endParaRPr lang="en-US" dirty="0"/>
+            <a:pPr lvl="1"/>
+            <a:r>
+              <a:rPr lang="en-US" sz="1400" dirty="0" smtClean="0"/>
+              <a:t>Enterprise Version</a:t>
+            </a:r>
+          </a:p>
+          <a:p>
+            <a:pPr lvl="2"/>
+            <a:r>
+              <a:rPr lang="en-US" dirty="0"/>
+              <a:t>list </a:t>
+            </a:r>
+            <a:r>
+              <a:rPr lang="en-US" dirty="0"/>
+              <a:t>competitive prices from other </a:t>
+            </a:r>
+            <a:r>
+              <a:rPr lang="en-US" dirty="0"/>
+              <a:t>retailers</a:t>
+            </a:r>
+          </a:p>
+          <a:p>
+            <a:pPr lvl="2"/>
+            <a:r>
+              <a:rPr lang="en-US" dirty="0"/>
+              <a:t>enable </a:t>
+            </a:r>
+            <a:r>
+              <a:rPr lang="en-US" dirty="0"/>
+              <a:t>product-specific low price alert from competitors </a:t>
+            </a:r>
+          </a:p>
+          <a:p>
+            <a:pPr lvl="2"/>
+            <a:r>
+              <a:rPr lang="en-US" dirty="0"/>
+              <a:t>provide </a:t>
+            </a:r>
+            <a:r>
+              <a:rPr lang="en-US" dirty="0"/>
+              <a:t>coupons for </a:t>
+            </a:r>
+            <a:r>
+              <a:rPr lang="en-US" dirty="0"/>
+              <a:t>users</a:t>
+            </a:r>
+          </a:p>
+          <a:p>
+            <a:pPr lvl="2"/>
+            <a:r>
+              <a:rPr lang="en-US" dirty="0"/>
+              <a:t>provide </a:t>
+            </a:r>
+            <a:r>
+              <a:rPr lang="en-US" dirty="0"/>
+              <a:t>the option to purchase prioritization </a:t>
+            </a:r>
           </a:p>
         </p:txBody>
       </p:sp>
     </p:spTree>
     <p:extLst>
       <p:ext uri="{BB962C8B-B14F-4D97-AF65-F5344CB8AC3E}">
-        <p14:creationId xmlns:p14="http://schemas.microsoft.com/office/powerpoint/2010/main" val="1678666698"/>
+        <p14:creationId xmlns:p14="http://schemas.microsoft.com/office/powerpoint/2010/main" val="268605665"/>
       </p:ext>
     </p:extLst>
   </p:cSld>

</xml_diff>

<commit_message>
remove duplicate future page
</commit_message>
<xml_diff>
--- a/IBM_Finish_Line.pptx
+++ b/IBM_Finish_Line.pptx
@@ -5,7 +5,7 @@
     <p:sldMasterId id="2147483869" r:id="rId1"/>
   </p:sldMasterIdLst>
   <p:notesMasterIdLst>
-    <p:notesMasterId r:id="rId16"/>
+    <p:notesMasterId r:id="rId15"/>
   </p:notesMasterIdLst>
   <p:sldIdLst>
     <p:sldId id="260" r:id="rId2"/>
@@ -15,13 +15,12 @@
     <p:sldId id="259" r:id="rId6"/>
     <p:sldId id="275" r:id="rId7"/>
     <p:sldId id="268" r:id="rId8"/>
-    <p:sldId id="264" r:id="rId9"/>
-    <p:sldId id="279" r:id="rId10"/>
-    <p:sldId id="280" r:id="rId11"/>
-    <p:sldId id="274" r:id="rId12"/>
-    <p:sldId id="277" r:id="rId13"/>
-    <p:sldId id="271" r:id="rId14"/>
-    <p:sldId id="272" r:id="rId15"/>
+    <p:sldId id="279" r:id="rId9"/>
+    <p:sldId id="280" r:id="rId10"/>
+    <p:sldId id="274" r:id="rId11"/>
+    <p:sldId id="277" r:id="rId12"/>
+    <p:sldId id="271" r:id="rId13"/>
+    <p:sldId id="272" r:id="rId14"/>
   </p:sldIdLst>
   <p:sldSz cx="9144000" cy="6858000" type="screen4x3"/>
   <p:notesSz cx="6858000" cy="9144000"/>
@@ -643,7 +642,7 @@
           <a:p>
             <a:fld id="{0BEC1035-22C6-4F8A-960B-5C00BC661B2D}" type="slidenum">
               <a:rPr lang="en-US" smtClean="0"/>
-              <a:t>10</a:t>
+              <a:t>9</a:t>
             </a:fld>
             <a:endParaRPr lang="en-US"/>
           </a:p>
@@ -6596,7 +6595,7 @@
           <p:cNvPr id="2" name="Title 1">
             <a:extLst>
               <a:ext uri="{FF2B5EF4-FFF2-40B4-BE49-F238E27FC236}">
-                <a16:creationId xmlns:a16="http://schemas.microsoft.com/office/drawing/2014/main" xmlns="" id="{E2A1A099-F8AF-492B-BE56-F120E0E56980}"/>
+                <a16:creationId xmlns="" xmlns:a16="http://schemas.microsoft.com/office/drawing/2014/main" id="{E2A1A099-F8AF-492B-BE56-F120E0E56980}"/>
               </a:ext>
             </a:extLst>
           </p:cNvPr>
@@ -6754,7 +6753,7 @@
           <p:cNvPr id="3" name="Subtitle 2">
             <a:extLst>
               <a:ext uri="{FF2B5EF4-FFF2-40B4-BE49-F238E27FC236}">
-                <a16:creationId xmlns:a16="http://schemas.microsoft.com/office/drawing/2014/main" xmlns="" id="{07F6A7EB-4B9B-42F8-9054-48ABF81993F7}"/>
+                <a16:creationId xmlns="" xmlns:a16="http://schemas.microsoft.com/office/drawing/2014/main" id="{07F6A7EB-4B9B-42F8-9054-48ABF81993F7}"/>
               </a:ext>
             </a:extLst>
           </p:cNvPr>
@@ -6800,6 +6799,13 @@
   <p:clrMapOvr>
     <a:masterClrMapping/>
   </p:clrMapOvr>
+  <p:timing>
+    <p:tnLst>
+      <p:par>
+        <p:cTn id="1" dur="indefinite" restart="never" nodeType="tmRoot"/>
+      </p:par>
+    </p:tnLst>
+  </p:timing>
 </p:sld>
 </file>
 
@@ -6843,7 +6849,7 @@
           <a:p>
             <a:r>
               <a:rPr lang="en-US" dirty="0"/>
-              <a:t>Technical Challenges</a:t>
+              <a:t>Financial Viability</a:t>
             </a:r>
           </a:p>
         </p:txBody>
@@ -6866,192 +6872,6 @@
         </p:nvSpPr>
         <p:spPr>
           <a:xfrm>
-            <a:off x="609598" y="2160590"/>
-            <a:ext cx="6934201" cy="3880773"/>
-          </a:xfrm>
-        </p:spPr>
-        <p:txBody>
-          <a:bodyPr/>
-          <a:lstStyle/>
-          <a:p>
-            <a:r>
-              <a:rPr lang="en-US" sz="1600" dirty="0" smtClean="0"/>
-              <a:t>Collect </a:t>
-            </a:r>
-            <a:r>
-              <a:rPr lang="en-US" sz="1600" dirty="0"/>
-              <a:t>r</a:t>
-            </a:r>
-            <a:r>
-              <a:rPr lang="en-US" sz="1600" dirty="0" smtClean="0"/>
-              <a:t>eal-time </a:t>
-            </a:r>
-            <a:r>
-              <a:rPr lang="en-US" sz="1600" dirty="0" smtClean="0"/>
-              <a:t>prices </a:t>
-            </a:r>
-            <a:r>
-              <a:rPr lang="en-US" sz="1600" dirty="0" smtClean="0"/>
-              <a:t>with</a:t>
-            </a:r>
-            <a:r>
-              <a:rPr lang="en-US" sz="1600" dirty="0" smtClean="0"/>
-              <a:t> </a:t>
-            </a:r>
-            <a:r>
-              <a:rPr lang="en-US" sz="1600" dirty="0" smtClean="0"/>
-              <a:t>a web crawler for the </a:t>
-            </a:r>
-            <a:r>
-              <a:rPr lang="en-US" sz="1600" dirty="0"/>
-              <a:t>products</a:t>
-            </a:r>
-            <a:r>
-              <a:rPr lang="en-US" sz="1600" dirty="0" smtClean="0"/>
-              <a:t> </a:t>
-            </a:r>
-            <a:r>
-              <a:rPr lang="en-US" sz="1600" dirty="0" smtClean="0"/>
-              <a:t>hosted</a:t>
-            </a:r>
-          </a:p>
-          <a:p>
-            <a:endParaRPr lang="en-US" sz="1600" dirty="0" smtClean="0"/>
-          </a:p>
-          <a:p>
-            <a:r>
-              <a:rPr lang="en-US" sz="1600" dirty="0" smtClean="0"/>
-              <a:t>Integrate Database </a:t>
-            </a:r>
-            <a:r>
-              <a:rPr lang="en-US" sz="1600" dirty="0" smtClean="0"/>
-              <a:t>Service to the </a:t>
-            </a:r>
-            <a:r>
-              <a:rPr lang="en-US" sz="1600" dirty="0" smtClean="0"/>
-              <a:t>application:</a:t>
-            </a:r>
-          </a:p>
-          <a:p>
-            <a:pPr lvl="1"/>
-            <a:r>
-              <a:rPr lang="en-US" sz="1400" dirty="0" smtClean="0"/>
-              <a:t>IBM </a:t>
-            </a:r>
-            <a:r>
-              <a:rPr lang="en-US" sz="1400" dirty="0"/>
-              <a:t>Watson Discovery </a:t>
-            </a:r>
-            <a:r>
-              <a:rPr lang="en-US" sz="1400" dirty="0" smtClean="0"/>
-              <a:t>API</a:t>
-            </a:r>
-          </a:p>
-          <a:p>
-            <a:pPr lvl="1"/>
-            <a:r>
-              <a:rPr lang="en-US" sz="1400" dirty="0"/>
-              <a:t>Visual Recognition API in future</a:t>
-            </a:r>
-          </a:p>
-          <a:p>
-            <a:pPr>
-              <a:buFont typeface="Courier New" charset="0"/>
-              <a:buChar char="o"/>
-            </a:pPr>
-            <a:endParaRPr lang="en-US" dirty="0" smtClean="0"/>
-          </a:p>
-          <a:p>
-            <a:pPr marL="0" indent="0">
-              <a:buNone/>
-            </a:pPr>
-            <a:r>
-              <a:rPr lang="en-US" dirty="0" smtClean="0"/>
-              <a:t>	</a:t>
-            </a:r>
-            <a:endParaRPr lang="en-US" dirty="0"/>
-          </a:p>
-          <a:p>
-            <a:endParaRPr lang="en-US" dirty="0"/>
-          </a:p>
-        </p:txBody>
-      </p:sp>
-    </p:spTree>
-    <p:extLst>
-      <p:ext uri="{BB962C8B-B14F-4D97-AF65-F5344CB8AC3E}">
-        <p14:creationId xmlns:p14="http://schemas.microsoft.com/office/powerpoint/2010/main" val="623462683"/>
-      </p:ext>
-    </p:extLst>
-  </p:cSld>
-  <p:clrMapOvr>
-    <a:masterClrMapping/>
-  </p:clrMapOvr>
-</p:sld>
-</file>
-
-<file path=ppt/slides/slide11.xml><?xml version="1.0" encoding="utf-8"?>
-<p:sld xmlns:a="http://schemas.openxmlformats.org/drawingml/2006/main" xmlns:r="http://schemas.openxmlformats.org/officeDocument/2006/relationships" xmlns:p="http://schemas.openxmlformats.org/presentationml/2006/main">
-  <p:cSld>
-    <p:spTree>
-      <p:nvGrpSpPr>
-        <p:cNvPr id="1" name=""/>
-        <p:cNvGrpSpPr/>
-        <p:nvPr/>
-      </p:nvGrpSpPr>
-      <p:grpSpPr>
-        <a:xfrm>
-          <a:off x="0" y="0"/>
-          <a:ext cx="0" cy="0"/>
-          <a:chOff x="0" y="0"/>
-          <a:chExt cx="0" cy="0"/>
-        </a:xfrm>
-      </p:grpSpPr>
-      <p:sp>
-        <p:nvSpPr>
-          <p:cNvPr id="2" name="Title 1">
-            <a:extLst>
-              <a:ext uri="{FF2B5EF4-FFF2-40B4-BE49-F238E27FC236}">
-                <a16:creationId xmlns:a16="http://schemas.microsoft.com/office/drawing/2014/main" xmlns="" id="{6E1A8408-C1FC-4D47-8F2B-25551BDF2B97}"/>
-              </a:ext>
-            </a:extLst>
-          </p:cNvPr>
-          <p:cNvSpPr>
-            <a:spLocks noGrp="1"/>
-          </p:cNvSpPr>
-          <p:nvPr>
-            <p:ph type="title"/>
-          </p:nvPr>
-        </p:nvSpPr>
-        <p:spPr/>
-        <p:txBody>
-          <a:bodyPr/>
-          <a:lstStyle/>
-          <a:p>
-            <a:r>
-              <a:rPr lang="en-US" dirty="0"/>
-              <a:t>Financial Viability</a:t>
-            </a:r>
-          </a:p>
-        </p:txBody>
-      </p:sp>
-      <p:sp>
-        <p:nvSpPr>
-          <p:cNvPr id="3" name="Content Placeholder 2">
-            <a:extLst>
-              <a:ext uri="{FF2B5EF4-FFF2-40B4-BE49-F238E27FC236}">
-                <a16:creationId xmlns:a16="http://schemas.microsoft.com/office/drawing/2014/main" xmlns="" id="{0E8E19FB-E60B-465D-B108-C003DDA0B568}"/>
-              </a:ext>
-            </a:extLst>
-          </p:cNvPr>
-          <p:cNvSpPr>
-            <a:spLocks noGrp="1"/>
-          </p:cNvSpPr>
-          <p:nvPr>
-            <p:ph idx="1"/>
-          </p:nvPr>
-        </p:nvSpPr>
-        <p:spPr>
-          <a:xfrm>
             <a:off x="609599" y="1524000"/>
             <a:ext cx="4495801" cy="4876800"/>
           </a:xfrm>
@@ -7139,7 +6959,7 @@
           <p:cNvPr id="4" name="Picture 3">
             <a:extLst>
               <a:ext uri="{FF2B5EF4-FFF2-40B4-BE49-F238E27FC236}">
-                <a16:creationId xmlns:a16="http://schemas.microsoft.com/office/drawing/2014/main" xmlns="" id="{F3B17938-214B-40E9-9969-983709355BE3}"/>
+                <a16:creationId xmlns="" xmlns:a16="http://schemas.microsoft.com/office/drawing/2014/main" id="{F3B17938-214B-40E9-9969-983709355BE3}"/>
               </a:ext>
             </a:extLst>
           </p:cNvPr>
@@ -7174,6 +6994,166 @@
   <p:clrMapOvr>
     <a:masterClrMapping/>
   </p:clrMapOvr>
+  <p:timing>
+    <p:tnLst>
+      <p:par>
+        <p:cTn id="1" dur="indefinite" restart="never" nodeType="tmRoot"/>
+      </p:par>
+    </p:tnLst>
+  </p:timing>
+</p:sld>
+</file>
+
+<file path=ppt/slides/slide11.xml><?xml version="1.0" encoding="utf-8"?>
+<p:sld xmlns:a="http://schemas.openxmlformats.org/drawingml/2006/main" xmlns:r="http://schemas.openxmlformats.org/officeDocument/2006/relationships" xmlns:p="http://schemas.openxmlformats.org/presentationml/2006/main">
+  <p:cSld>
+    <p:spTree>
+      <p:nvGrpSpPr>
+        <p:cNvPr id="1" name=""/>
+        <p:cNvGrpSpPr/>
+        <p:nvPr/>
+      </p:nvGrpSpPr>
+      <p:grpSpPr>
+        <a:xfrm>
+          <a:off x="0" y="0"/>
+          <a:ext cx="0" cy="0"/>
+          <a:chOff x="0" y="0"/>
+          <a:chExt cx="0" cy="0"/>
+        </a:xfrm>
+      </p:grpSpPr>
+      <p:sp>
+        <p:nvSpPr>
+          <p:cNvPr id="2" name="Title 1">
+            <a:extLst>
+              <a:ext uri="{FF2B5EF4-FFF2-40B4-BE49-F238E27FC236}">
+                <a16:creationId xmlns="" xmlns:a16="http://schemas.microsoft.com/office/drawing/2014/main" id="{6E1A8408-C1FC-4D47-8F2B-25551BDF2B97}"/>
+              </a:ext>
+            </a:extLst>
+          </p:cNvPr>
+          <p:cNvSpPr>
+            <a:spLocks noGrp="1"/>
+          </p:cNvSpPr>
+          <p:nvPr>
+            <p:ph type="title"/>
+          </p:nvPr>
+        </p:nvSpPr>
+        <p:spPr/>
+        <p:txBody>
+          <a:bodyPr/>
+          <a:lstStyle/>
+          <a:p>
+            <a:r>
+              <a:rPr lang="en-US" dirty="0"/>
+              <a:t>Ask</a:t>
+            </a:r>
+          </a:p>
+        </p:txBody>
+      </p:sp>
+      <p:sp>
+        <p:nvSpPr>
+          <p:cNvPr id="3" name="Content Placeholder 2">
+            <a:extLst>
+              <a:ext uri="{FF2B5EF4-FFF2-40B4-BE49-F238E27FC236}">
+                <a16:creationId xmlns="" xmlns:a16="http://schemas.microsoft.com/office/drawing/2014/main" id="{0E8E19FB-E60B-465D-B108-C003DDA0B568}"/>
+              </a:ext>
+            </a:extLst>
+          </p:cNvPr>
+          <p:cNvSpPr>
+            <a:spLocks noGrp="1"/>
+          </p:cNvSpPr>
+          <p:nvPr>
+            <p:ph idx="1"/>
+          </p:nvPr>
+        </p:nvSpPr>
+        <p:spPr>
+          <a:xfrm>
+            <a:off x="609599" y="1752600"/>
+            <a:ext cx="6347714" cy="4288763"/>
+          </a:xfrm>
+        </p:spPr>
+        <p:txBody>
+          <a:bodyPr>
+            <a:normAutofit/>
+          </a:bodyPr>
+          <a:lstStyle/>
+          <a:p>
+            <a:endParaRPr lang="en-US" dirty="0"/>
+          </a:p>
+          <a:p>
+            <a:r>
+              <a:rPr lang="en-US" dirty="0"/>
+              <a:t>$200,000 for 10% stake in the company</a:t>
+            </a:r>
+          </a:p>
+          <a:p>
+            <a:r>
+              <a:rPr lang="en-US" dirty="0"/>
+              <a:t>5 founding members</a:t>
+            </a:r>
+          </a:p>
+          <a:p>
+            <a:pPr lvl="1"/>
+            <a:r>
+              <a:rPr lang="en-US" dirty="0"/>
+              <a:t>Team could expand to up to 10 people</a:t>
+            </a:r>
+          </a:p>
+          <a:p>
+            <a:endParaRPr lang="en-US" dirty="0"/>
+          </a:p>
+          <a:p>
+            <a:r>
+              <a:rPr lang="en-US" dirty="0"/>
+              <a:t>Profitability to IBM</a:t>
+            </a:r>
+          </a:p>
+          <a:p>
+            <a:pPr lvl="1"/>
+            <a:r>
+              <a:rPr lang="en-US" dirty="0"/>
+              <a:t>IBM Watson can harness consumer behavior and data</a:t>
+            </a:r>
+          </a:p>
+          <a:p>
+            <a:pPr lvl="1"/>
+            <a:r>
+              <a:rPr lang="en-US" dirty="0"/>
+              <a:t>Dictating the traffic through e-commerce world</a:t>
+            </a:r>
+          </a:p>
+          <a:p>
+            <a:pPr lvl="1"/>
+            <a:r>
+              <a:rPr lang="en-US" dirty="0"/>
+              <a:t>Potential profitability from e-commerce sales</a:t>
+            </a:r>
+          </a:p>
+          <a:p>
+            <a:pPr lvl="1"/>
+            <a:r>
+              <a:rPr lang="en-US" dirty="0"/>
+              <a:t>Good marketing and branding opportunity for IBM Watson and IBM Cloud services</a:t>
+            </a:r>
+          </a:p>
+        </p:txBody>
+      </p:sp>
+    </p:spTree>
+    <p:extLst>
+      <p:ext uri="{BB962C8B-B14F-4D97-AF65-F5344CB8AC3E}">
+        <p14:creationId xmlns:p14="http://schemas.microsoft.com/office/powerpoint/2010/main" val="1911603262"/>
+      </p:ext>
+    </p:extLst>
+  </p:cSld>
+  <p:clrMapOvr>
+    <a:masterClrMapping/>
+  </p:clrMapOvr>
+  <p:timing>
+    <p:tnLst>
+      <p:par>
+        <p:cTn id="1" dur="indefinite" restart="never" nodeType="tmRoot"/>
+      </p:par>
+    </p:tnLst>
+  </p:timing>
 </p:sld>
 </file>
 
@@ -7199,7 +7179,7 @@
           <p:cNvPr id="2" name="Title 1">
             <a:extLst>
               <a:ext uri="{FF2B5EF4-FFF2-40B4-BE49-F238E27FC236}">
-                <a16:creationId xmlns:a16="http://schemas.microsoft.com/office/drawing/2014/main" xmlns="" id="{6E1A8408-C1FC-4D47-8F2B-25551BDF2B97}"/>
+                <a16:creationId xmlns="" xmlns:a16="http://schemas.microsoft.com/office/drawing/2014/main" id="{6E1A8408-C1FC-4D47-8F2B-25551BDF2B97}"/>
               </a:ext>
             </a:extLst>
           </p:cNvPr>
@@ -7210,102 +7190,20 @@
             <p:ph type="title"/>
           </p:nvPr>
         </p:nvSpPr>
-        <p:spPr/>
+        <p:spPr>
+          <a:xfrm>
+            <a:off x="685800" y="2667000"/>
+            <a:ext cx="6347713" cy="1320800"/>
+          </a:xfrm>
+        </p:spPr>
         <p:txBody>
           <a:bodyPr/>
           <a:lstStyle/>
           <a:p>
+            <a:pPr algn="ctr"/>
             <a:r>
               <a:rPr lang="en-US" dirty="0"/>
-              <a:t>Ask</a:t>
-            </a:r>
-          </a:p>
-        </p:txBody>
-      </p:sp>
-      <p:sp>
-        <p:nvSpPr>
-          <p:cNvPr id="3" name="Content Placeholder 2">
-            <a:extLst>
-              <a:ext uri="{FF2B5EF4-FFF2-40B4-BE49-F238E27FC236}">
-                <a16:creationId xmlns:a16="http://schemas.microsoft.com/office/drawing/2014/main" xmlns="" id="{0E8E19FB-E60B-465D-B108-C003DDA0B568}"/>
-              </a:ext>
-            </a:extLst>
-          </p:cNvPr>
-          <p:cNvSpPr>
-            <a:spLocks noGrp="1"/>
-          </p:cNvSpPr>
-          <p:nvPr>
-            <p:ph idx="1"/>
-          </p:nvPr>
-        </p:nvSpPr>
-        <p:spPr>
-          <a:xfrm>
-            <a:off x="609599" y="1752600"/>
-            <a:ext cx="6347714" cy="4288763"/>
-          </a:xfrm>
-        </p:spPr>
-        <p:txBody>
-          <a:bodyPr>
-            <a:normAutofit/>
-          </a:bodyPr>
-          <a:lstStyle/>
-          <a:p>
-            <a:endParaRPr lang="en-US" dirty="0"/>
-          </a:p>
-          <a:p>
-            <a:r>
-              <a:rPr lang="en-US" dirty="0"/>
-              <a:t>$200,000 for 10% stake in the company</a:t>
-            </a:r>
-          </a:p>
-          <a:p>
-            <a:r>
-              <a:rPr lang="en-US" dirty="0"/>
-              <a:t>5 founding members</a:t>
-            </a:r>
-          </a:p>
-          <a:p>
-            <a:pPr lvl="1"/>
-            <a:r>
-              <a:rPr lang="en-US" dirty="0"/>
-              <a:t>Team could expand to up to 10 people</a:t>
-            </a:r>
-          </a:p>
-          <a:p>
-            <a:endParaRPr lang="en-US" dirty="0"/>
-          </a:p>
-          <a:p>
-            <a:r>
-              <a:rPr lang="en-US" dirty="0"/>
-              <a:t>Profitability to IBM</a:t>
-            </a:r>
-          </a:p>
-          <a:p>
-            <a:pPr lvl="1"/>
-            <a:r>
-              <a:rPr lang="en-US" dirty="0"/>
-              <a:t>IBM Watson can harness consumer behavior and data</a:t>
-            </a:r>
-          </a:p>
-          <a:p>
-            <a:pPr lvl="1"/>
-            <a:r>
-              <a:rPr lang="en-US" dirty="0"/>
-              <a:t>Dictating the traffic through e-commerce world</a:t>
-            </a:r>
-          </a:p>
-          <a:p>
-            <a:pPr lvl="1"/>
-            <a:r>
-              <a:rPr lang="en-US" dirty="0"/>
-              <a:t>Potential profitability from e-commerce sales</a:t>
-            </a:r>
-          </a:p>
-          <a:p>
-            <a:pPr lvl="1"/>
-            <a:r>
-              <a:rPr lang="en-US" dirty="0"/>
-              <a:t>Good marketing and branding opportunity for IBM Watson and IBM Cloud services</a:t>
+              <a:t>Questions?</a:t>
             </a:r>
           </a:p>
         </p:txBody>
@@ -7313,13 +7211,20 @@
     </p:spTree>
     <p:extLst>
       <p:ext uri="{BB962C8B-B14F-4D97-AF65-F5344CB8AC3E}">
-        <p14:creationId xmlns:p14="http://schemas.microsoft.com/office/powerpoint/2010/main" val="1911603262"/>
+        <p14:creationId xmlns:p14="http://schemas.microsoft.com/office/powerpoint/2010/main" val="2587019108"/>
       </p:ext>
     </p:extLst>
   </p:cSld>
   <p:clrMapOvr>
     <a:masterClrMapping/>
   </p:clrMapOvr>
+  <p:timing>
+    <p:tnLst>
+      <p:par>
+        <p:cTn id="1" dur="indefinite" restart="never" nodeType="tmRoot"/>
+      </p:par>
+    </p:tnLst>
+  </p:timing>
 </p:sld>
 </file>
 
@@ -7345,71 +7250,7 @@
           <p:cNvPr id="2" name="Title 1">
             <a:extLst>
               <a:ext uri="{FF2B5EF4-FFF2-40B4-BE49-F238E27FC236}">
-                <a16:creationId xmlns:a16="http://schemas.microsoft.com/office/drawing/2014/main" xmlns="" id="{6E1A8408-C1FC-4D47-8F2B-25551BDF2B97}"/>
-              </a:ext>
-            </a:extLst>
-          </p:cNvPr>
-          <p:cNvSpPr>
-            <a:spLocks noGrp="1"/>
-          </p:cNvSpPr>
-          <p:nvPr>
-            <p:ph type="title"/>
-          </p:nvPr>
-        </p:nvSpPr>
-        <p:spPr>
-          <a:xfrm>
-            <a:off x="685800" y="2667000"/>
-            <a:ext cx="6347713" cy="1320800"/>
-          </a:xfrm>
-        </p:spPr>
-        <p:txBody>
-          <a:bodyPr/>
-          <a:lstStyle/>
-          <a:p>
-            <a:pPr algn="ctr"/>
-            <a:r>
-              <a:rPr lang="en-US" dirty="0"/>
-              <a:t>Questions?</a:t>
-            </a:r>
-          </a:p>
-        </p:txBody>
-      </p:sp>
-    </p:spTree>
-    <p:extLst>
-      <p:ext uri="{BB962C8B-B14F-4D97-AF65-F5344CB8AC3E}">
-        <p14:creationId xmlns:p14="http://schemas.microsoft.com/office/powerpoint/2010/main" val="2587019108"/>
-      </p:ext>
-    </p:extLst>
-  </p:cSld>
-  <p:clrMapOvr>
-    <a:masterClrMapping/>
-  </p:clrMapOvr>
-</p:sld>
-</file>
-
-<file path=ppt/slides/slide14.xml><?xml version="1.0" encoding="utf-8"?>
-<p:sld xmlns:a="http://schemas.openxmlformats.org/drawingml/2006/main" xmlns:r="http://schemas.openxmlformats.org/officeDocument/2006/relationships" xmlns:p="http://schemas.openxmlformats.org/presentationml/2006/main">
-  <p:cSld>
-    <p:spTree>
-      <p:nvGrpSpPr>
-        <p:cNvPr id="1" name=""/>
-        <p:cNvGrpSpPr/>
-        <p:nvPr/>
-      </p:nvGrpSpPr>
-      <p:grpSpPr>
-        <a:xfrm>
-          <a:off x="0" y="0"/>
-          <a:ext cx="0" cy="0"/>
-          <a:chOff x="0" y="0"/>
-          <a:chExt cx="0" cy="0"/>
-        </a:xfrm>
-      </p:grpSpPr>
-      <p:sp>
-        <p:nvSpPr>
-          <p:cNvPr id="2" name="Title 1">
-            <a:extLst>
-              <a:ext uri="{FF2B5EF4-FFF2-40B4-BE49-F238E27FC236}">
-                <a16:creationId xmlns:a16="http://schemas.microsoft.com/office/drawing/2014/main" xmlns="" id="{6E1A8408-C1FC-4D47-8F2B-25551BDF2B97}"/>
+                <a16:creationId xmlns="" xmlns:a16="http://schemas.microsoft.com/office/drawing/2014/main" id="{6E1A8408-C1FC-4D47-8F2B-25551BDF2B97}"/>
               </a:ext>
             </a:extLst>
           </p:cNvPr>
@@ -7448,6 +7289,13 @@
   <p:clrMapOvr>
     <a:masterClrMapping/>
   </p:clrMapOvr>
+  <p:timing>
+    <p:tnLst>
+      <p:par>
+        <p:cTn id="1" dur="indefinite" restart="never" nodeType="tmRoot"/>
+      </p:par>
+    </p:tnLst>
+  </p:timing>
 </p:sld>
 </file>
 
@@ -7473,7 +7321,7 @@
           <p:cNvPr id="2" name="Title 1">
             <a:extLst>
               <a:ext uri="{FF2B5EF4-FFF2-40B4-BE49-F238E27FC236}">
-                <a16:creationId xmlns:a16="http://schemas.microsoft.com/office/drawing/2014/main" xmlns="" id="{3188D881-550A-41E6-A87E-293AA0FE7C23}"/>
+                <a16:creationId xmlns="" xmlns:a16="http://schemas.microsoft.com/office/drawing/2014/main" id="{3188D881-550A-41E6-A87E-293AA0FE7C23}"/>
               </a:ext>
             </a:extLst>
           </p:cNvPr>
@@ -7506,7 +7354,7 @@
           <p:cNvPr id="6" name="TextBox 5">
             <a:extLst>
               <a:ext uri="{FF2B5EF4-FFF2-40B4-BE49-F238E27FC236}">
-                <a16:creationId xmlns:a16="http://schemas.microsoft.com/office/drawing/2014/main" xmlns="" id="{D0480103-D79A-491B-A532-E087DBC9A8BD}"/>
+                <a16:creationId xmlns="" xmlns:a16="http://schemas.microsoft.com/office/drawing/2014/main" id="{D0480103-D79A-491B-A532-E087DBC9A8BD}"/>
               </a:ext>
             </a:extLst>
           </p:cNvPr>
@@ -7548,7 +7396,7 @@
           <p:cNvPr id="7" name="TextBox 6">
             <a:extLst>
               <a:ext uri="{FF2B5EF4-FFF2-40B4-BE49-F238E27FC236}">
-                <a16:creationId xmlns:a16="http://schemas.microsoft.com/office/drawing/2014/main" xmlns="" id="{EA911CD3-AC9B-4D41-AECF-649D5D7DFB63}"/>
+                <a16:creationId xmlns="" xmlns:a16="http://schemas.microsoft.com/office/drawing/2014/main" id="{EA911CD3-AC9B-4D41-AECF-649D5D7DFB63}"/>
               </a:ext>
             </a:extLst>
           </p:cNvPr>
@@ -7580,7 +7428,7 @@
           <p:cNvPr id="19" name="Picture 18" descr="A person wearing a suit and tie standing in front of a mountain&#10;&#10;Description generated with very high confidence">
             <a:extLst>
               <a:ext uri="{FF2B5EF4-FFF2-40B4-BE49-F238E27FC236}">
-                <a16:creationId xmlns:a16="http://schemas.microsoft.com/office/drawing/2014/main" xmlns="" id="{4149E916-6496-4963-B969-F84B8CFC655B}"/>
+                <a16:creationId xmlns="" xmlns:a16="http://schemas.microsoft.com/office/drawing/2014/main" id="{4149E916-6496-4963-B969-F84B8CFC655B}"/>
               </a:ext>
             </a:extLst>
           </p:cNvPr>
@@ -7640,7 +7488,7 @@
           <p:cNvPr id="21" name="Picture 20" descr="A person smiling for the camera&#10;&#10;Description generated with very high confidence">
             <a:extLst>
               <a:ext uri="{FF2B5EF4-FFF2-40B4-BE49-F238E27FC236}">
-                <a16:creationId xmlns:a16="http://schemas.microsoft.com/office/drawing/2014/main" xmlns="" id="{A5BF7E92-F55B-4340-829D-55D589957F02}"/>
+                <a16:creationId xmlns="" xmlns:a16="http://schemas.microsoft.com/office/drawing/2014/main" id="{A5BF7E92-F55B-4340-829D-55D589957F02}"/>
               </a:ext>
             </a:extLst>
           </p:cNvPr>
@@ -7700,7 +7548,7 @@
           <p:cNvPr id="23" name="Picture 22" descr="A person standing in front of a building&#10;&#10;Description generated with very high confidence">
             <a:extLst>
               <a:ext uri="{FF2B5EF4-FFF2-40B4-BE49-F238E27FC236}">
-                <a16:creationId xmlns:a16="http://schemas.microsoft.com/office/drawing/2014/main" xmlns="" id="{55AFD24E-0D23-475A-8512-1F0A5195FAF0}"/>
+                <a16:creationId xmlns="" xmlns:a16="http://schemas.microsoft.com/office/drawing/2014/main" id="{55AFD24E-0D23-475A-8512-1F0A5195FAF0}"/>
               </a:ext>
             </a:extLst>
           </p:cNvPr>
@@ -7760,7 +7608,7 @@
           <p:cNvPr id="25" name="Picture 24" descr="A person smiling for the camera&#10;&#10;Description generated with very high confidence">
             <a:extLst>
               <a:ext uri="{FF2B5EF4-FFF2-40B4-BE49-F238E27FC236}">
-                <a16:creationId xmlns:a16="http://schemas.microsoft.com/office/drawing/2014/main" xmlns="" id="{F9837DF5-FA52-4FDE-B184-005CAC1DB9A2}"/>
+                <a16:creationId xmlns="" xmlns:a16="http://schemas.microsoft.com/office/drawing/2014/main" id="{F9837DF5-FA52-4FDE-B184-005CAC1DB9A2}"/>
               </a:ext>
             </a:extLst>
           </p:cNvPr>
@@ -7820,7 +7668,7 @@
           <p:cNvPr id="27" name="Picture 26" descr="A person posing for the camera&#10;&#10;Description generated with very high confidence">
             <a:extLst>
               <a:ext uri="{FF2B5EF4-FFF2-40B4-BE49-F238E27FC236}">
-                <a16:creationId xmlns:a16="http://schemas.microsoft.com/office/drawing/2014/main" xmlns="" id="{9E43DA31-7EB1-4E8B-B3F2-B1DDAB347C17}"/>
+                <a16:creationId xmlns="" xmlns:a16="http://schemas.microsoft.com/office/drawing/2014/main" id="{9E43DA31-7EB1-4E8B-B3F2-B1DDAB347C17}"/>
               </a:ext>
             </a:extLst>
           </p:cNvPr>
@@ -7880,7 +7728,7 @@
           <p:cNvPr id="28" name="TextBox 27">
             <a:extLst>
               <a:ext uri="{FF2B5EF4-FFF2-40B4-BE49-F238E27FC236}">
-                <a16:creationId xmlns:a16="http://schemas.microsoft.com/office/drawing/2014/main" xmlns="" id="{5D619666-7BBB-47FA-8EAF-B4CA7335AD95}"/>
+                <a16:creationId xmlns="" xmlns:a16="http://schemas.microsoft.com/office/drawing/2014/main" id="{5D619666-7BBB-47FA-8EAF-B4CA7335AD95}"/>
               </a:ext>
             </a:extLst>
           </p:cNvPr>
@@ -7932,7 +7780,7 @@
           <p:cNvPr id="29" name="TextBox 28">
             <a:extLst>
               <a:ext uri="{FF2B5EF4-FFF2-40B4-BE49-F238E27FC236}">
-                <a16:creationId xmlns:a16="http://schemas.microsoft.com/office/drawing/2014/main" xmlns="" id="{6C2C4A43-E148-4BA9-A330-5B6C5DBA5703}"/>
+                <a16:creationId xmlns="" xmlns:a16="http://schemas.microsoft.com/office/drawing/2014/main" id="{6C2C4A43-E148-4BA9-A330-5B6C5DBA5703}"/>
               </a:ext>
             </a:extLst>
           </p:cNvPr>
@@ -7975,7 +7823,7 @@
           <p:cNvPr id="30" name="TextBox 29">
             <a:extLst>
               <a:ext uri="{FF2B5EF4-FFF2-40B4-BE49-F238E27FC236}">
-                <a16:creationId xmlns:a16="http://schemas.microsoft.com/office/drawing/2014/main" xmlns="" id="{9A30CE70-C767-475D-9A05-175D9DBED8F9}"/>
+                <a16:creationId xmlns="" xmlns:a16="http://schemas.microsoft.com/office/drawing/2014/main" id="{9A30CE70-C767-475D-9A05-175D9DBED8F9}"/>
               </a:ext>
             </a:extLst>
           </p:cNvPr>
@@ -8023,7 +7871,7 @@
           <p:cNvPr id="31" name="TextBox 30">
             <a:extLst>
               <a:ext uri="{FF2B5EF4-FFF2-40B4-BE49-F238E27FC236}">
-                <a16:creationId xmlns:a16="http://schemas.microsoft.com/office/drawing/2014/main" xmlns="" id="{33D41E7E-E77C-42FA-A120-C910A10C8182}"/>
+                <a16:creationId xmlns="" xmlns:a16="http://schemas.microsoft.com/office/drawing/2014/main" id="{33D41E7E-E77C-42FA-A120-C910A10C8182}"/>
               </a:ext>
             </a:extLst>
           </p:cNvPr>
@@ -8076,6 +7924,13 @@
   <p:clrMapOvr>
     <a:masterClrMapping/>
   </p:clrMapOvr>
+  <p:timing>
+    <p:tnLst>
+      <p:par>
+        <p:cTn id="1" dur="indefinite" restart="never" nodeType="tmRoot"/>
+      </p:par>
+    </p:tnLst>
+  </p:timing>
 </p:sld>
 </file>
 
@@ -8101,7 +7956,7 @@
           <p:cNvPr id="2" name="Title 1">
             <a:extLst>
               <a:ext uri="{FF2B5EF4-FFF2-40B4-BE49-F238E27FC236}">
-                <a16:creationId xmlns:a16="http://schemas.microsoft.com/office/drawing/2014/main" xmlns="" id="{3188D881-550A-41E6-A87E-293AA0FE7C23}"/>
+                <a16:creationId xmlns="" xmlns:a16="http://schemas.microsoft.com/office/drawing/2014/main" id="{3188D881-550A-41E6-A87E-293AA0FE7C23}"/>
               </a:ext>
             </a:extLst>
           </p:cNvPr>
@@ -8129,7 +7984,7 @@
           <p:cNvPr id="3" name="Content Placeholder 2">
             <a:extLst>
               <a:ext uri="{FF2B5EF4-FFF2-40B4-BE49-F238E27FC236}">
-                <a16:creationId xmlns:a16="http://schemas.microsoft.com/office/drawing/2014/main" xmlns="" id="{62CD92CC-4728-42D6-8460-6A5E60E3DA0E}"/>
+                <a16:creationId xmlns="" xmlns:a16="http://schemas.microsoft.com/office/drawing/2014/main" id="{62CD92CC-4728-42D6-8460-6A5E60E3DA0E}"/>
               </a:ext>
             </a:extLst>
           </p:cNvPr>
@@ -8238,6 +8093,13 @@
   <p:clrMapOvr>
     <a:masterClrMapping/>
   </p:clrMapOvr>
+  <p:timing>
+    <p:tnLst>
+      <p:par>
+        <p:cTn id="1" dur="indefinite" restart="never" nodeType="tmRoot"/>
+      </p:par>
+    </p:tnLst>
+  </p:timing>
 </p:sld>
 </file>
 
@@ -8263,7 +8125,7 @@
           <p:cNvPr id="2" name="Title 1">
             <a:extLst>
               <a:ext uri="{FF2B5EF4-FFF2-40B4-BE49-F238E27FC236}">
-                <a16:creationId xmlns:a16="http://schemas.microsoft.com/office/drawing/2014/main" xmlns="" id="{6E1A8408-C1FC-4D47-8F2B-25551BDF2B97}"/>
+                <a16:creationId xmlns="" xmlns:a16="http://schemas.microsoft.com/office/drawing/2014/main" id="{6E1A8408-C1FC-4D47-8F2B-25551BDF2B97}"/>
               </a:ext>
             </a:extLst>
           </p:cNvPr>
@@ -8291,7 +8153,7 @@
           <p:cNvPr id="6" name="Content Placeholder 5">
             <a:extLst>
               <a:ext uri="{FF2B5EF4-FFF2-40B4-BE49-F238E27FC236}">
-                <a16:creationId xmlns:a16="http://schemas.microsoft.com/office/drawing/2014/main" xmlns="" id="{BB739F05-A5CA-437E-A958-54F2F82E8214}"/>
+                <a16:creationId xmlns="" xmlns:a16="http://schemas.microsoft.com/office/drawing/2014/main" id="{BB739F05-A5CA-437E-A958-54F2F82E8214}"/>
               </a:ext>
             </a:extLst>
           </p:cNvPr>
@@ -8405,6 +8267,13 @@
   <p:clrMapOvr>
     <a:masterClrMapping/>
   </p:clrMapOvr>
+  <p:timing>
+    <p:tnLst>
+      <p:par>
+        <p:cTn id="1" dur="indefinite" restart="never" nodeType="tmRoot"/>
+      </p:par>
+    </p:tnLst>
+  </p:timing>
 </p:sld>
 </file>
 
@@ -9980,6 +9849,13 @@
   <p:clrMapOvr>
     <a:masterClrMapping/>
   </p:clrMapOvr>
+  <p:timing>
+    <p:tnLst>
+      <p:par>
+        <p:cTn id="1" dur="indefinite" restart="never" nodeType="tmRoot"/>
+      </p:par>
+    </p:tnLst>
+  </p:timing>
 </p:sld>
 </file>
 
@@ -10013,7 +9889,7 @@
           <p:cNvPr id="20" name="Content Placeholder 3">
             <a:extLst>
               <a:ext uri="{FF2B5EF4-FFF2-40B4-BE49-F238E27FC236}">
-                <a16:creationId xmlns:a16="http://schemas.microsoft.com/office/drawing/2014/main" xmlns="" id="{3FA67D4D-93C6-4E8C-9CA5-553585E04A1C}"/>
+                <a16:creationId xmlns="" xmlns:a16="http://schemas.microsoft.com/office/drawing/2014/main" id="{3FA67D4D-93C6-4E8C-9CA5-553585E04A1C}"/>
               </a:ext>
             </a:extLst>
           </p:cNvPr>
@@ -10043,7 +9919,7 @@
           <p:cNvPr id="2" name="Title 1">
             <a:extLst>
               <a:ext uri="{FF2B5EF4-FFF2-40B4-BE49-F238E27FC236}">
-                <a16:creationId xmlns:a16="http://schemas.microsoft.com/office/drawing/2014/main" xmlns="" id="{6E1A8408-C1FC-4D47-8F2B-25551BDF2B97}"/>
+                <a16:creationId xmlns="" xmlns:a16="http://schemas.microsoft.com/office/drawing/2014/main" id="{6E1A8408-C1FC-4D47-8F2B-25551BDF2B97}"/>
               </a:ext>
             </a:extLst>
           </p:cNvPr>
@@ -10162,6 +10038,13 @@
   <p:clrMapOvr>
     <a:masterClrMapping/>
   </p:clrMapOvr>
+  <p:timing>
+    <p:tnLst>
+      <p:par>
+        <p:cTn id="1" dur="indefinite" restart="never" nodeType="tmRoot"/>
+      </p:par>
+    </p:tnLst>
+  </p:timing>
 </p:sld>
 </file>
 
@@ -10187,7 +10070,7 @@
           <p:cNvPr id="2" name="Title 1">
             <a:extLst>
               <a:ext uri="{FF2B5EF4-FFF2-40B4-BE49-F238E27FC236}">
-                <a16:creationId xmlns:a16="http://schemas.microsoft.com/office/drawing/2014/main" xmlns="" id="{6E1A8408-C1FC-4D47-8F2B-25551BDF2B97}"/>
+                <a16:creationId xmlns="" xmlns:a16="http://schemas.microsoft.com/office/drawing/2014/main" id="{6E1A8408-C1FC-4D47-8F2B-25551BDF2B97}"/>
               </a:ext>
             </a:extLst>
           </p:cNvPr>
@@ -10215,7 +10098,7 @@
           <p:cNvPr id="3" name="Content Placeholder 2">
             <a:extLst>
               <a:ext uri="{FF2B5EF4-FFF2-40B4-BE49-F238E27FC236}">
-                <a16:creationId xmlns:a16="http://schemas.microsoft.com/office/drawing/2014/main" xmlns="" id="{0E8E19FB-E60B-465D-B108-C003DDA0B568}"/>
+                <a16:creationId xmlns="" xmlns:a16="http://schemas.microsoft.com/office/drawing/2014/main" id="{0E8E19FB-E60B-465D-B108-C003DDA0B568}"/>
               </a:ext>
             </a:extLst>
           </p:cNvPr>
@@ -10304,6 +10187,13 @@
   <p:clrMapOvr>
     <a:masterClrMapping/>
   </p:clrMapOvr>
+  <p:timing>
+    <p:tnLst>
+      <p:par>
+        <p:cTn id="1" dur="indefinite" restart="never" nodeType="tmRoot"/>
+      </p:par>
+    </p:tnLst>
+  </p:timing>
 </p:sld>
 </file>
 
@@ -10329,7 +10219,7 @@
           <p:cNvPr id="2" name="Title 1">
             <a:extLst>
               <a:ext uri="{FF2B5EF4-FFF2-40B4-BE49-F238E27FC236}">
-                <a16:creationId xmlns:a16="http://schemas.microsoft.com/office/drawing/2014/main" xmlns="" id="{6E1A8408-C1FC-4D47-8F2B-25551BDF2B97}"/>
+                <a16:creationId xmlns="" xmlns:a16="http://schemas.microsoft.com/office/drawing/2014/main" id="{6E1A8408-C1FC-4D47-8F2B-25551BDF2B97}"/>
               </a:ext>
             </a:extLst>
           </p:cNvPr>
@@ -10362,7 +10252,7 @@
           <p:cNvPr id="3" name="Content Placeholder 2">
             <a:extLst>
               <a:ext uri="{FF2B5EF4-FFF2-40B4-BE49-F238E27FC236}">
-                <a16:creationId xmlns:a16="http://schemas.microsoft.com/office/drawing/2014/main" xmlns="" id="{0E8E19FB-E60B-465D-B108-C003DDA0B568}"/>
+                <a16:creationId xmlns="" xmlns:a16="http://schemas.microsoft.com/office/drawing/2014/main" id="{0E8E19FB-E60B-465D-B108-C003DDA0B568}"/>
               </a:ext>
             </a:extLst>
           </p:cNvPr>
@@ -10386,83 +10276,149 @@
           <a:lstStyle/>
           <a:p>
             <a:r>
-              <a:rPr lang="en-US" sz="1600" dirty="0"/>
-              <a:t>Free app for consumers</a:t>
+              <a:rPr lang="en-US" sz="1600" dirty="0" smtClean="0"/>
+              <a:t>Consumers</a:t>
             </a:r>
           </a:p>
           <a:p>
             <a:pPr lvl="1"/>
             <a:r>
+              <a:rPr lang="en-US" sz="1400" dirty="0" smtClean="0"/>
+              <a:t>expand </a:t>
+            </a:r>
+            <a:r>
+              <a:rPr lang="en-US" sz="1400" dirty="0"/>
+              <a:t>the available products for </a:t>
+            </a:r>
+            <a:r>
+              <a:rPr lang="en-US" sz="1400" dirty="0" smtClean="0"/>
+              <a:t>search</a:t>
+            </a:r>
+          </a:p>
+          <a:p>
+            <a:pPr lvl="1"/>
+            <a:r>
+              <a:rPr lang="en-US" sz="1400" dirty="0" smtClean="0"/>
+              <a:t>expand </a:t>
+            </a:r>
+            <a:r>
+              <a:rPr lang="en-US" sz="1400" dirty="0"/>
+              <a:t>the pricing sources for the same product </a:t>
+            </a:r>
+            <a:endParaRPr lang="en-US" sz="1400" dirty="0" smtClean="0"/>
+          </a:p>
+          <a:p>
+            <a:pPr lvl="1"/>
+            <a:r>
+              <a:rPr lang="en-US" sz="1400" dirty="0" smtClean="0"/>
+              <a:t>analyze </a:t>
+            </a:r>
+            <a:r>
+              <a:rPr lang="en-US" sz="1400" dirty="0"/>
+              <a:t>consumer behaviors from the historical conversation data	Watson Toner Analyzer for Sentiment </a:t>
+            </a:r>
+            <a:r>
+              <a:rPr lang="en-US" sz="1400" dirty="0" smtClean="0"/>
+              <a:t>Analysis</a:t>
+            </a:r>
+          </a:p>
+          <a:p>
+            <a:pPr lvl="1"/>
+            <a:r>
+              <a:rPr lang="en-US" sz="1400" dirty="0" smtClean="0"/>
+              <a:t>enable </a:t>
+            </a:r>
+            <a:r>
+              <a:rPr lang="en-US" sz="1400" dirty="0"/>
+              <a:t>low price subscription </a:t>
+            </a:r>
+            <a:r>
+              <a:rPr lang="en-US" sz="1400" dirty="0" smtClean="0"/>
+              <a:t>alert</a:t>
+            </a:r>
+          </a:p>
+          <a:p>
+            <a:pPr lvl="1"/>
+            <a:r>
+              <a:rPr lang="en-US" sz="1400" dirty="0" smtClean="0"/>
+              <a:t>enable </a:t>
+            </a:r>
+            <a:r>
+              <a:rPr lang="en-US" sz="1400" dirty="0"/>
+              <a:t>image input from consumers	</a:t>
+            </a:r>
+            <a:r>
+              <a:rPr lang="en-US" sz="1400" dirty="0" smtClean="0"/>
+              <a:t>(Watson </a:t>
+            </a:r>
+            <a:r>
+              <a:rPr lang="en-US" sz="1400" dirty="0"/>
+              <a:t>Visual Recognition </a:t>
+            </a:r>
+            <a:r>
+              <a:rPr lang="en-US" sz="1400" dirty="0" smtClean="0"/>
+              <a:t>API)</a:t>
+            </a:r>
+            <a:endParaRPr lang="en-US" sz="1400" dirty="0"/>
+          </a:p>
+          <a:p>
+            <a:r>
+              <a:rPr lang="en-US" sz="1600" dirty="0" smtClean="0"/>
+              <a:t>Retailer</a:t>
+            </a:r>
+          </a:p>
+          <a:p>
+            <a:pPr lvl="1"/>
+            <a:r>
+              <a:rPr lang="en-US" sz="1400" dirty="0" smtClean="0"/>
+              <a:t>Basic Version</a:t>
+            </a:r>
+          </a:p>
+          <a:p>
+            <a:pPr lvl="2"/>
+            <a:r>
               <a:rPr lang="en-US" dirty="0"/>
-              <a:t>Implement additional products for Watson conversations</a:t>
-            </a:r>
+              <a:t>provide a separate interface for </a:t>
+            </a:r>
+            <a:r>
+              <a:rPr lang="en-US" dirty="0" smtClean="0"/>
+              <a:t>retailers</a:t>
+            </a:r>
+            <a:endParaRPr lang="en-US" dirty="0"/>
           </a:p>
           <a:p>
             <a:pPr lvl="1"/>
             <a:r>
+              <a:rPr lang="en-US" sz="1400" dirty="0" smtClean="0"/>
+              <a:t>Enterprise Version</a:t>
+            </a:r>
+          </a:p>
+          <a:p>
+            <a:pPr lvl="2"/>
+            <a:r>
               <a:rPr lang="en-US" dirty="0"/>
-              <a:t>Compare the products and prices from different retailers and return the output in a tabular form</a:t>
-            </a:r>
-          </a:p>
-          <a:p>
-            <a:pPr lvl="1"/>
+              <a:t>list competitive prices from other retailers</a:t>
+            </a:r>
+          </a:p>
+          <a:p>
+            <a:pPr lvl="2"/>
             <a:r>
               <a:rPr lang="en-US" dirty="0"/>
-              <a:t>Use Watson to analyze customer behavior and harness data</a:t>
-            </a:r>
-          </a:p>
-          <a:p>
-            <a:pPr lvl="1"/>
+              <a:t>enable product-specific low price alert from competitors </a:t>
+            </a:r>
+          </a:p>
+          <a:p>
+            <a:pPr lvl="2"/>
             <a:r>
               <a:rPr lang="en-US" dirty="0"/>
-              <a:t>Recognize an object picture using visual recognition and Discovery API </a:t>
-            </a:r>
-          </a:p>
-          <a:p>
-            <a:pPr lvl="1"/>
+              <a:t>provide coupons for users</a:t>
+            </a:r>
+          </a:p>
+          <a:p>
+            <a:pPr lvl="2"/>
             <a:r>
               <a:rPr lang="en-US" dirty="0"/>
-              <a:t>Low price subscription alert</a:t>
-            </a:r>
-          </a:p>
-          <a:p>
-            <a:pPr marL="0" indent="0">
-              <a:buNone/>
-            </a:pPr>
-            <a:endParaRPr lang="en-US" sz="1600" dirty="0"/>
-          </a:p>
-          <a:p>
-            <a:r>
-              <a:rPr lang="en-US" sz="1600" dirty="0"/>
-              <a:t>Watson Retail as a service</a:t>
-            </a:r>
-          </a:p>
-          <a:p>
-            <a:pPr lvl="1"/>
-            <a:r>
-              <a:rPr lang="en-US" dirty="0"/>
-              <a:t>Provide retailers with a different interface for application</a:t>
-            </a:r>
-          </a:p>
-          <a:p>
-            <a:pPr lvl="1"/>
-            <a:r>
-              <a:rPr lang="en-US" dirty="0"/>
-              <a:t>Give them a list of competitive prices from other retailers</a:t>
-            </a:r>
-          </a:p>
-          <a:p>
-            <a:pPr lvl="1"/>
-            <a:r>
-              <a:rPr lang="en-US" dirty="0"/>
-              <a:t>Product-specific low price alerts for competitors</a:t>
-            </a:r>
-          </a:p>
-          <a:p>
-            <a:pPr lvl="1"/>
-            <a:r>
-              <a:rPr lang="en-US" dirty="0"/>
-              <a:t>Provide the option to purchase prioritization</a:t>
+              <a:t>provide the option to purchase prioritization </a:t>
             </a:r>
           </a:p>
         </p:txBody>
@@ -10470,13 +10426,20 @@
     </p:spTree>
     <p:extLst>
       <p:ext uri="{BB962C8B-B14F-4D97-AF65-F5344CB8AC3E}">
-        <p14:creationId xmlns:p14="http://schemas.microsoft.com/office/powerpoint/2010/main" val="600973285"/>
+        <p14:creationId xmlns:p14="http://schemas.microsoft.com/office/powerpoint/2010/main" val="268605665"/>
       </p:ext>
     </p:extLst>
   </p:cSld>
   <p:clrMapOvr>
     <a:masterClrMapping/>
   </p:clrMapOvr>
+  <p:timing>
+    <p:tnLst>
+      <p:par>
+        <p:cTn id="1" dur="indefinite" restart="never" nodeType="tmRoot"/>
+      </p:par>
+    </p:tnLst>
+  </p:timing>
 </p:sld>
 </file>
 
@@ -10513,19 +10476,14 @@
             <p:ph type="title"/>
           </p:nvPr>
         </p:nvSpPr>
-        <p:spPr>
-          <a:xfrm>
-            <a:off x="609599" y="609600"/>
-            <a:ext cx="6347713" cy="1320800"/>
-          </a:xfrm>
-        </p:spPr>
+        <p:spPr/>
         <p:txBody>
           <a:bodyPr/>
           <a:lstStyle/>
           <a:p>
             <a:r>
               <a:rPr lang="en-US" dirty="0"/>
-              <a:t>Future Expectations</a:t>
+              <a:t>Technical Challenges</a:t>
             </a:r>
           </a:p>
         </p:txBody>
@@ -10548,202 +10506,105 @@
         </p:nvSpPr>
         <p:spPr>
           <a:xfrm>
-            <a:off x="609599" y="1382697"/>
-            <a:ext cx="6858002" cy="4876800"/>
+            <a:off x="609598" y="2160590"/>
+            <a:ext cx="6934201" cy="3880773"/>
           </a:xfrm>
         </p:spPr>
         <p:txBody>
-          <a:bodyPr>
-            <a:noAutofit/>
-          </a:bodyPr>
+          <a:bodyPr/>
           <a:lstStyle/>
           <a:p>
             <a:r>
               <a:rPr lang="en-US" sz="1600" dirty="0" smtClean="0"/>
-              <a:t>Consumers</a:t>
+              <a:t>Collect </a:t>
+            </a:r>
+            <a:r>
+              <a:rPr lang="en-US" sz="1600" dirty="0"/>
+              <a:t>r</a:t>
+            </a:r>
+            <a:r>
+              <a:rPr lang="en-US" sz="1600" dirty="0" smtClean="0"/>
+              <a:t>eal-time prices with a web crawler for the </a:t>
+            </a:r>
+            <a:r>
+              <a:rPr lang="en-US" sz="1600" dirty="0"/>
+              <a:t>products</a:t>
+            </a:r>
+            <a:r>
+              <a:rPr lang="en-US" sz="1600" dirty="0" smtClean="0"/>
+              <a:t> hosted</a:t>
+            </a:r>
+          </a:p>
+          <a:p>
+            <a:endParaRPr lang="en-US" sz="1600" dirty="0" smtClean="0"/>
+          </a:p>
+          <a:p>
+            <a:r>
+              <a:rPr lang="en-US" sz="1600" dirty="0" smtClean="0"/>
+              <a:t>Integrate Database Service to the application:</a:t>
             </a:r>
           </a:p>
           <a:p>
             <a:pPr lvl="1"/>
             <a:r>
               <a:rPr lang="en-US" sz="1400" dirty="0" smtClean="0"/>
-              <a:t>expand </a:t>
+              <a:t>IBM </a:t>
             </a:r>
             <a:r>
               <a:rPr lang="en-US" sz="1400" dirty="0"/>
-              <a:t>the available products for </a:t>
+              <a:t>Watson Discovery </a:t>
             </a:r>
             <a:r>
               <a:rPr lang="en-US" sz="1400" dirty="0" smtClean="0"/>
-              <a:t>search</a:t>
+              <a:t>API</a:t>
             </a:r>
           </a:p>
           <a:p>
             <a:pPr lvl="1"/>
             <a:r>
-              <a:rPr lang="en-US" sz="1400" dirty="0" smtClean="0"/>
-              <a:t>expand </a:t>
-            </a:r>
-            <a:r>
               <a:rPr lang="en-US" sz="1400" dirty="0"/>
-              <a:t>the pricing sources for the same product </a:t>
-            </a:r>
-            <a:endParaRPr lang="en-US" sz="1400" dirty="0" smtClean="0"/>
-          </a:p>
-          <a:p>
-            <a:pPr lvl="1"/>
-            <a:r>
-              <a:rPr lang="en-US" sz="1400" dirty="0" smtClean="0"/>
-              <a:t>analyze </a:t>
-            </a:r>
-            <a:r>
-              <a:rPr lang="en-US" sz="1400" dirty="0"/>
-              <a:t>consumer behaviors from the historical conversation data	Watson Toner Analyzer for Sentiment </a:t>
-            </a:r>
-            <a:r>
-              <a:rPr lang="en-US" sz="1400" dirty="0" smtClean="0"/>
-              <a:t>Analysis</a:t>
-            </a:r>
-          </a:p>
-          <a:p>
-            <a:pPr lvl="1"/>
-            <a:r>
-              <a:rPr lang="en-US" sz="1400" dirty="0" smtClean="0"/>
-              <a:t>enable </a:t>
-            </a:r>
-            <a:r>
-              <a:rPr lang="en-US" sz="1400" dirty="0"/>
-              <a:t>low price subscription </a:t>
-            </a:r>
-            <a:r>
-              <a:rPr lang="en-US" sz="1400" dirty="0" smtClean="0"/>
-              <a:t>alert</a:t>
-            </a:r>
-          </a:p>
-          <a:p>
-            <a:pPr lvl="1"/>
-            <a:r>
-              <a:rPr lang="en-US" sz="1400" dirty="0" smtClean="0"/>
-              <a:t>enable </a:t>
-            </a:r>
-            <a:r>
-              <a:rPr lang="en-US" sz="1400" dirty="0"/>
-              <a:t>image input from consumers	</a:t>
-            </a:r>
-            <a:r>
-              <a:rPr lang="en-US" sz="1400" dirty="0" smtClean="0"/>
-              <a:t>(Watson </a:t>
-            </a:r>
-            <a:r>
-              <a:rPr lang="en-US" sz="1400" dirty="0"/>
-              <a:t>Visual Recognition </a:t>
-            </a:r>
-            <a:r>
-              <a:rPr lang="en-US" sz="1400" dirty="0" smtClean="0"/>
-              <a:t>API)</a:t>
-            </a:r>
-            <a:endParaRPr lang="en-US" sz="1400" dirty="0"/>
-          </a:p>
-          <a:p>
-            <a:r>
-              <a:rPr lang="en-US" sz="1600" dirty="0" smtClean="0"/>
-              <a:t>Retailer</a:t>
-            </a:r>
-          </a:p>
-          <a:p>
-            <a:pPr lvl="1"/>
-            <a:r>
-              <a:rPr lang="en-US" sz="1400" dirty="0" smtClean="0"/>
-              <a:t>Basic Version</a:t>
-            </a:r>
-          </a:p>
-          <a:p>
-            <a:pPr lvl="2"/>
-            <a:r>
-              <a:rPr lang="en-US" dirty="0"/>
-              <a:t>provide </a:t>
-            </a:r>
-            <a:r>
-              <a:rPr lang="en-US" dirty="0"/>
-              <a:t>a separate interface for </a:t>
-            </a:r>
+              <a:t>Visual Recognition API in future</a:t>
+            </a:r>
+          </a:p>
+          <a:p>
+            <a:pPr>
+              <a:buFont typeface="Courier New" charset="0"/>
+              <a:buChar char="o"/>
+            </a:pPr>
+            <a:endParaRPr lang="en-US" dirty="0" smtClean="0"/>
+          </a:p>
+          <a:p>
+            <a:pPr marL="0" indent="0">
+              <a:buNone/>
+            </a:pPr>
             <a:r>
               <a:rPr lang="en-US" dirty="0" smtClean="0"/>
-              <a:t>retailers</a:t>
+              <a:t>	</a:t>
             </a:r>
             <a:endParaRPr lang="en-US" dirty="0"/>
           </a:p>
           <a:p>
-            <a:pPr lvl="1"/>
-            <a:r>
-              <a:rPr lang="en-US" sz="1400" dirty="0" smtClean="0"/>
-              <a:t>Enterprise Version</a:t>
-            </a:r>
-          </a:p>
-          <a:p>
-            <a:pPr lvl="2"/>
-            <a:r>
-              <a:rPr lang="en-US" dirty="0"/>
-              <a:t>list </a:t>
-            </a:r>
-            <a:r>
-              <a:rPr lang="en-US" dirty="0"/>
-              <a:t>competitive prices from other </a:t>
-            </a:r>
-            <a:r>
-              <a:rPr lang="en-US" dirty="0"/>
-              <a:t>retailers</a:t>
-            </a:r>
-          </a:p>
-          <a:p>
-            <a:pPr lvl="2"/>
-            <a:r>
-              <a:rPr lang="en-US" dirty="0"/>
-              <a:t>enable </a:t>
-            </a:r>
-            <a:r>
-              <a:rPr lang="en-US" dirty="0"/>
-              <a:t>product-specific low price alert from competitors </a:t>
-            </a:r>
-          </a:p>
-          <a:p>
-            <a:pPr lvl="2"/>
-            <a:r>
-              <a:rPr lang="en-US" dirty="0"/>
-              <a:t>provide </a:t>
-            </a:r>
-            <a:r>
-              <a:rPr lang="en-US" dirty="0"/>
-              <a:t>coupons for </a:t>
-            </a:r>
-            <a:r>
-              <a:rPr lang="en-US" dirty="0"/>
-              <a:t>users</a:t>
-            </a:r>
-          </a:p>
-          <a:p>
-            <a:pPr lvl="2"/>
-            <a:r>
-              <a:rPr lang="en-US" dirty="0"/>
-              <a:t>provide </a:t>
-            </a:r>
-            <a:r>
-              <a:rPr lang="en-US" dirty="0"/>
-              <a:t>the option to purchase prioritization </a:t>
-            </a:r>
+            <a:endParaRPr lang="en-US" dirty="0"/>
           </a:p>
         </p:txBody>
       </p:sp>
     </p:spTree>
     <p:extLst>
       <p:ext uri="{BB962C8B-B14F-4D97-AF65-F5344CB8AC3E}">
-        <p14:creationId xmlns:p14="http://schemas.microsoft.com/office/powerpoint/2010/main" val="268605665"/>
+        <p14:creationId xmlns:p14="http://schemas.microsoft.com/office/powerpoint/2010/main" val="623462683"/>
       </p:ext>
     </p:extLst>
   </p:cSld>
   <p:clrMapOvr>
     <a:masterClrMapping/>
   </p:clrMapOvr>
+  <p:timing>
+    <p:tnLst>
+      <p:par>
+        <p:cTn id="1" dur="indefinite" restart="never" nodeType="tmRoot"/>
+      </p:par>
+    </p:tnLst>
+  </p:timing>
 </p:sld>
 </file>
 

</xml_diff>